<commit_message>
small changes/comments adding units to variables
</commit_message>
<xml_diff>
--- a/documentation/sisyphe/convergence_sed.pptx
+++ b/documentation/sisyphe/convergence_sed.pptx
@@ -315,7 +315,7 @@
           <a:p>
             <a:fld id="{AA309A6D-C09C-4548-B29A-6CF363A7E532}" type="datetimeFigureOut">
               <a:rPr lang="fr-FR" smtClean="0"/>
-              <a:t>17/10/2017</a:t>
+              <a:t>13/11/2017</a:t>
             </a:fld>
             <a:endParaRPr lang="fr-BE"/>
           </a:p>
@@ -480,7 +480,7 @@
           <a:p>
             <a:fld id="{AA309A6D-C09C-4548-B29A-6CF363A7E532}" type="datetimeFigureOut">
               <a:rPr lang="fr-FR" smtClean="0"/>
-              <a:t>17/10/2017</a:t>
+              <a:t>13/11/2017</a:t>
             </a:fld>
             <a:endParaRPr lang="fr-BE"/>
           </a:p>
@@ -655,7 +655,7 @@
           <a:p>
             <a:fld id="{AA309A6D-C09C-4548-B29A-6CF363A7E532}" type="datetimeFigureOut">
               <a:rPr lang="fr-FR" smtClean="0"/>
-              <a:t>17/10/2017</a:t>
+              <a:t>13/11/2017</a:t>
             </a:fld>
             <a:endParaRPr lang="fr-BE"/>
           </a:p>
@@ -820,7 +820,7 @@
           <a:p>
             <a:fld id="{AA309A6D-C09C-4548-B29A-6CF363A7E532}" type="datetimeFigureOut">
               <a:rPr lang="fr-FR" smtClean="0"/>
-              <a:t>17/10/2017</a:t>
+              <a:t>13/11/2017</a:t>
             </a:fld>
             <a:endParaRPr lang="fr-BE"/>
           </a:p>
@@ -1061,7 +1061,7 @@
           <a:p>
             <a:fld id="{AA309A6D-C09C-4548-B29A-6CF363A7E532}" type="datetimeFigureOut">
               <a:rPr lang="fr-FR" smtClean="0"/>
-              <a:t>17/10/2017</a:t>
+              <a:t>13/11/2017</a:t>
             </a:fld>
             <a:endParaRPr lang="fr-BE"/>
           </a:p>
@@ -1344,7 +1344,7 @@
           <a:p>
             <a:fld id="{AA309A6D-C09C-4548-B29A-6CF363A7E532}" type="datetimeFigureOut">
               <a:rPr lang="fr-FR" smtClean="0"/>
-              <a:t>17/10/2017</a:t>
+              <a:t>13/11/2017</a:t>
             </a:fld>
             <a:endParaRPr lang="fr-BE"/>
           </a:p>
@@ -1761,7 +1761,7 @@
           <a:p>
             <a:fld id="{AA309A6D-C09C-4548-B29A-6CF363A7E532}" type="datetimeFigureOut">
               <a:rPr lang="fr-FR" smtClean="0"/>
-              <a:t>17/10/2017</a:t>
+              <a:t>13/11/2017</a:t>
             </a:fld>
             <a:endParaRPr lang="fr-BE"/>
           </a:p>
@@ -1874,7 +1874,7 @@
           <a:p>
             <a:fld id="{AA309A6D-C09C-4548-B29A-6CF363A7E532}" type="datetimeFigureOut">
               <a:rPr lang="fr-FR" smtClean="0"/>
-              <a:t>17/10/2017</a:t>
+              <a:t>13/11/2017</a:t>
             </a:fld>
             <a:endParaRPr lang="fr-BE"/>
           </a:p>
@@ -1964,7 +1964,7 @@
           <a:p>
             <a:fld id="{AA309A6D-C09C-4548-B29A-6CF363A7E532}" type="datetimeFigureOut">
               <a:rPr lang="fr-FR" smtClean="0"/>
-              <a:t>17/10/2017</a:t>
+              <a:t>13/11/2017</a:t>
             </a:fld>
             <a:endParaRPr lang="fr-BE"/>
           </a:p>
@@ -2236,7 +2236,7 @@
           <a:p>
             <a:fld id="{AA309A6D-C09C-4548-B29A-6CF363A7E532}" type="datetimeFigureOut">
               <a:rPr lang="fr-FR" smtClean="0"/>
-              <a:t>17/10/2017</a:t>
+              <a:t>13/11/2017</a:t>
             </a:fld>
             <a:endParaRPr lang="fr-BE"/>
           </a:p>
@@ -2484,7 +2484,7 @@
           <a:p>
             <a:fld id="{AA309A6D-C09C-4548-B29A-6CF363A7E532}" type="datetimeFigureOut">
               <a:rPr lang="fr-FR" smtClean="0"/>
-              <a:t>17/10/2017</a:t>
+              <a:t>13/11/2017</a:t>
             </a:fld>
             <a:endParaRPr lang="fr-BE"/>
           </a:p>
@@ -2692,7 +2692,7 @@
           <a:p>
             <a:fld id="{AA309A6D-C09C-4548-B29A-6CF363A7E532}" type="datetimeFigureOut">
               <a:rPr lang="fr-FR" smtClean="0"/>
-              <a:t>17/10/2017</a:t>
+              <a:t>13/11/2017</a:t>
             </a:fld>
             <a:endParaRPr lang="fr-BE"/>
           </a:p>
@@ -3490,7 +3490,39 @@
                   <a:schemeClr val="tx1"/>
                 </a:solidFill>
               </a:rPr>
-              <a:t>    </a:t>
+              <a:t>    (</a:t>
+            </a:r>
+            <a:r>
+              <a:rPr lang="fr-FR" sz="1300" b="1" dirty="0" smtClean="0">
+                <a:solidFill>
+                  <a:schemeClr val="accent1"/>
+                </a:solidFill>
+              </a:rPr>
+              <a:t>pas </a:t>
+            </a:r>
+            <a:r>
+              <a:rPr lang="fr-FR" sz="1300" b="1" dirty="0">
+                <a:solidFill>
+                  <a:schemeClr val="accent1"/>
+                </a:solidFill>
+              </a:rPr>
+              <a:t>de </a:t>
+            </a:r>
+            <a:r>
+              <a:rPr lang="fr-FR" sz="1300" b="1" dirty="0" smtClean="0">
+                <a:solidFill>
+                  <a:schemeClr val="accent1"/>
+                </a:solidFill>
+              </a:rPr>
+              <a:t>choix : </a:t>
+            </a:r>
+            <a:r>
+              <a:rPr lang="fr-FR" sz="1300" dirty="0" err="1" smtClean="0">
+                <a:solidFill>
+                  <a:schemeClr val="tx1"/>
+                </a:solidFill>
+              </a:rPr>
+              <a:t>Krone</a:t>
             </a:r>
             <a:r>
               <a:rPr lang="fr-FR" sz="1300" dirty="0" smtClean="0">
@@ -3498,63 +3530,7 @@
                   <a:schemeClr val="tx1"/>
                 </a:solidFill>
               </a:rPr>
-              <a:t>(</a:t>
-            </a:r>
-            <a:r>
-              <a:rPr lang="fr-FR" sz="1300" b="1" dirty="0" smtClean="0">
-                <a:solidFill>
-                  <a:schemeClr val="accent1"/>
-                </a:solidFill>
-              </a:rPr>
-              <a:t>pas </a:t>
-            </a:r>
-            <a:r>
-              <a:rPr lang="fr-FR" sz="1300" b="1" dirty="0">
-                <a:solidFill>
-                  <a:schemeClr val="accent1"/>
-                </a:solidFill>
-              </a:rPr>
-              <a:t>de </a:t>
-            </a:r>
-            <a:r>
-              <a:rPr lang="fr-FR" sz="1300" b="1" dirty="0" smtClean="0">
-                <a:solidFill>
-                  <a:schemeClr val="accent1"/>
-                </a:solidFill>
-              </a:rPr>
-              <a:t>choix : </a:t>
-            </a:r>
-            <a:r>
-              <a:rPr lang="fr-FR" sz="1300" dirty="0" err="1" smtClean="0">
-                <a:solidFill>
-                  <a:schemeClr val="tx1"/>
-                </a:solidFill>
-              </a:rPr>
-              <a:t>Krone</a:t>
-            </a:r>
-            <a:r>
-              <a:rPr lang="fr-FR" sz="1300" dirty="0" smtClean="0">
-                <a:solidFill>
-                  <a:schemeClr val="tx1"/>
-                </a:solidFill>
-              </a:rPr>
-              <a:t> </a:t>
-            </a:r>
-            <a:r>
-              <a:rPr lang="fr-FR" sz="1300" dirty="0" smtClean="0">
-                <a:solidFill>
-                  <a:schemeClr val="tx1"/>
-                </a:solidFill>
-              </a:rPr>
-              <a:t>et Part en automatique pour les </a:t>
-            </a:r>
-            <a:r>
-              <a:rPr lang="fr-FR" sz="1300" dirty="0" smtClean="0">
-                <a:solidFill>
-                  <a:schemeClr val="tx1"/>
-                </a:solidFill>
-              </a:rPr>
-              <a:t>vases)</a:t>
+              <a:t> et Part en automatique pour les vases)</a:t>
             </a:r>
             <a:endParaRPr lang="fr-FR" sz="1300" dirty="0">
               <a:solidFill>
@@ -6433,7 +6409,7 @@
         <p:spPr>
           <a:xfrm>
             <a:off x="4207720" y="18490"/>
-            <a:ext cx="2524520" cy="6678751"/>
+            <a:ext cx="2524520" cy="6617196"/>
           </a:xfrm>
           <a:prstGeom prst="rect">
             <a:avLst/>
@@ -6532,25 +6508,18 @@
                   </a:schemeClr>
                 </a:solidFill>
               </a:rPr>
-              <a:t>  SEND TO TELEMAC3D (FLUER)</a:t>
-            </a:r>
-          </a:p>
-          <a:p>
-            <a:r>
-              <a:rPr lang="fr-FR" sz="800" dirty="0"/>
-              <a:t>(?+?)</a:t>
-            </a:r>
-          </a:p>
-          <a:p>
-            <a:endParaRPr lang="fr-FR" sz="1200" dirty="0" smtClean="0"/>
-          </a:p>
-          <a:p>
-            <a:r>
-              <a:rPr lang="fr-FR" sz="1200" dirty="0" smtClean="0"/>
-              <a:t>ELSE</a:t>
-            </a:r>
-          </a:p>
-          <a:p>
+              <a:t>  SEND TO TELEMAC3D (</a:t>
+            </a:r>
+            <a:r>
+              <a:rPr lang="fr-FR" sz="1200" dirty="0" smtClean="0">
+                <a:solidFill>
+                  <a:schemeClr val="accent3">
+                    <a:lumMod val="75000"/>
+                  </a:schemeClr>
+                </a:solidFill>
+              </a:rPr>
+              <a:t>FLUER + FLUDPT)</a:t>
+            </a:r>
             <a:endParaRPr lang="fr-FR" sz="1200" dirty="0" smtClean="0">
               <a:solidFill>
                 <a:schemeClr val="accent3">
@@ -6561,25 +6530,57 @@
           </a:p>
           <a:p>
             <a:r>
-              <a:rPr lang="fr-FR" sz="1200" dirty="0" smtClean="0">
+              <a:rPr lang="fr-FR" sz="800" dirty="0" smtClean="0"/>
+              <a:t>   </a:t>
+            </a:r>
+            <a:r>
+              <a:rPr lang="fr-FR" sz="1000" dirty="0" smtClean="0">
                 <a:solidFill>
                   <a:schemeClr val="accent3">
                     <a:lumMod val="75000"/>
                   </a:schemeClr>
                 </a:solidFill>
               </a:rPr>
-              <a:t>  SEND </a:t>
-            </a:r>
-            <a:r>
-              <a:rPr lang="fr-FR" sz="1200" dirty="0">
+              <a:t>**FLUDPT: </a:t>
+            </a:r>
+            <a:r>
+              <a:rPr lang="fr-FR" sz="1000" u="sng" dirty="0" smtClean="0">
                 <a:solidFill>
                   <a:schemeClr val="accent3">
                     <a:lumMod val="75000"/>
                   </a:schemeClr>
                 </a:solidFill>
               </a:rPr>
-              <a:t>TO </a:t>
-            </a:r>
+              <a:t>CONDITIONS LIMITES</a:t>
+            </a:r>
+            <a:endParaRPr lang="fr-FR" sz="1000" u="sng" dirty="0" smtClean="0"/>
+          </a:p>
+          <a:p>
+            <a:r>
+              <a:rPr lang="fr-FR" sz="800" dirty="0" smtClean="0"/>
+              <a:t>(?+?)</a:t>
+            </a:r>
+            <a:endParaRPr lang="fr-FR" sz="800" dirty="0"/>
+          </a:p>
+          <a:p>
+            <a:endParaRPr lang="fr-FR" sz="1200" dirty="0" smtClean="0"/>
+          </a:p>
+          <a:p>
+            <a:r>
+              <a:rPr lang="fr-FR" sz="1200" dirty="0" smtClean="0"/>
+              <a:t>ELSE</a:t>
+            </a:r>
+          </a:p>
+          <a:p>
+            <a:endParaRPr lang="fr-FR" sz="1200" dirty="0" smtClean="0">
+              <a:solidFill>
+                <a:schemeClr val="accent3">
+                  <a:lumMod val="75000"/>
+                </a:schemeClr>
+              </a:solidFill>
+            </a:endParaRPr>
+          </a:p>
+          <a:p>
             <a:r>
               <a:rPr lang="fr-FR" sz="1200" dirty="0" smtClean="0">
                 <a:solidFill>
@@ -6588,7 +6589,7 @@
                   </a:schemeClr>
                 </a:solidFill>
               </a:rPr>
-              <a:t>TELEMAC2D </a:t>
+              <a:t>  SEND </a:t>
             </a:r>
             <a:r>
               <a:rPr lang="fr-FR" sz="1200" dirty="0">
@@ -6598,8 +6599,77 @@
                   </a:schemeClr>
                 </a:solidFill>
               </a:rPr>
-              <a:t>(FLUER)</a:t>
-            </a:r>
+              <a:t>TO </a:t>
+            </a:r>
+            <a:r>
+              <a:rPr lang="fr-FR" sz="1200" dirty="0" smtClean="0">
+                <a:solidFill>
+                  <a:schemeClr val="accent3">
+                    <a:lumMod val="75000"/>
+                  </a:schemeClr>
+                </a:solidFill>
+              </a:rPr>
+              <a:t>TELEMAC2D </a:t>
+            </a:r>
+            <a:r>
+              <a:rPr lang="fr-FR" sz="1200" dirty="0">
+                <a:solidFill>
+                  <a:schemeClr val="accent3">
+                    <a:lumMod val="75000"/>
+                  </a:schemeClr>
+                </a:solidFill>
+              </a:rPr>
+              <a:t>(</a:t>
+            </a:r>
+            <a:r>
+              <a:rPr lang="fr-FR" sz="1200" dirty="0" smtClean="0">
+                <a:solidFill>
+                  <a:schemeClr val="accent3">
+                    <a:lumMod val="75000"/>
+                  </a:schemeClr>
+                </a:solidFill>
+              </a:rPr>
+              <a:t>FLUER + FLUDPT)</a:t>
+            </a:r>
+          </a:p>
+          <a:p>
+            <a:r>
+              <a:rPr lang="fr-FR" sz="1000" smtClean="0">
+                <a:solidFill>
+                  <a:schemeClr val="accent3">
+                    <a:lumMod val="75000"/>
+                  </a:schemeClr>
+                </a:solidFill>
+              </a:rPr>
+              <a:t>  **FLUDPT</a:t>
+            </a:r>
+            <a:r>
+              <a:rPr lang="fr-FR" sz="1000" dirty="0">
+                <a:solidFill>
+                  <a:schemeClr val="accent3">
+                    <a:lumMod val="75000"/>
+                  </a:schemeClr>
+                </a:solidFill>
+              </a:rPr>
+              <a:t>: </a:t>
+            </a:r>
+            <a:r>
+              <a:rPr lang="fr-FR" sz="1000" u="sng" dirty="0" smtClean="0">
+                <a:solidFill>
+                  <a:schemeClr val="accent3">
+                    <a:lumMod val="75000"/>
+                  </a:schemeClr>
+                </a:solidFill>
+              </a:rPr>
+              <a:t>TERMES SOURCES</a:t>
+            </a:r>
+            <a:endParaRPr lang="fr-FR" sz="1000" u="sng" dirty="0">
+              <a:solidFill>
+                <a:schemeClr val="accent3">
+                  <a:lumMod val="75000"/>
+                </a:schemeClr>
+              </a:solidFill>
+            </a:endParaRPr>
           </a:p>
           <a:p>
             <a:r>
@@ -6664,18 +6734,6 @@
           </a:p>
           <a:p>
             <a:endParaRPr lang="fr-FR" sz="1200" dirty="0" smtClean="0"/>
-          </a:p>
-          <a:p>
-            <a:endParaRPr lang="fr-FR" sz="1200" dirty="0" smtClean="0"/>
-          </a:p>
-          <a:p>
-            <a:endParaRPr lang="fr-FR" sz="1200" dirty="0"/>
-          </a:p>
-          <a:p>
-            <a:endParaRPr lang="fr-FR" sz="1200" dirty="0" smtClean="0"/>
-          </a:p>
-          <a:p>
-            <a:endParaRPr lang="fr-FR" sz="1200" dirty="0"/>
           </a:p>
           <a:p>
             <a:endParaRPr lang="fr-FR" sz="1200" dirty="0"/>
@@ -6927,8 +6985,8 @@
         </p:nvCxnSpPr>
         <p:spPr>
           <a:xfrm>
-            <a:off x="6285628" y="2276872"/>
-            <a:ext cx="446612" cy="0"/>
+            <a:off x="6444208" y="2276872"/>
+            <a:ext cx="288032" cy="0"/>
           </a:xfrm>
           <a:prstGeom prst="straightConnector1">
             <a:avLst/>

</xml_diff>

<commit_message>
[src] Initialization and mean grain size
- computation of masses in init sediment, starting from mass ratio
- mean grain size computed with mass ratio, if new bed model
</commit_message>
<xml_diff>
--- a/documentation/sisyphe/convergence_sed.pptx
+++ b/documentation/sisyphe/convergence_sed.pptx
@@ -17,6 +17,7 @@
     <p:sldId id="257" r:id="rId11"/>
     <p:sldId id="256" r:id="rId12"/>
     <p:sldId id="258" r:id="rId13"/>
+    <p:sldId id="269" r:id="rId14"/>
   </p:sldIdLst>
   <p:sldSz cx="9144000" cy="6858000" type="screen4x3"/>
   <p:notesSz cx="6858000" cy="9144000"/>
@@ -315,7 +316,7 @@
           <a:p>
             <a:fld id="{AA309A6D-C09C-4548-B29A-6CF363A7E532}" type="datetimeFigureOut">
               <a:rPr lang="fr-FR" smtClean="0"/>
-              <a:t>13/11/2017</a:t>
+              <a:t>22/11/2017</a:t>
             </a:fld>
             <a:endParaRPr lang="fr-BE"/>
           </a:p>
@@ -480,7 +481,7 @@
           <a:p>
             <a:fld id="{AA309A6D-C09C-4548-B29A-6CF363A7E532}" type="datetimeFigureOut">
               <a:rPr lang="fr-FR" smtClean="0"/>
-              <a:t>13/11/2017</a:t>
+              <a:t>22/11/2017</a:t>
             </a:fld>
             <a:endParaRPr lang="fr-BE"/>
           </a:p>
@@ -655,7 +656,7 @@
           <a:p>
             <a:fld id="{AA309A6D-C09C-4548-B29A-6CF363A7E532}" type="datetimeFigureOut">
               <a:rPr lang="fr-FR" smtClean="0"/>
-              <a:t>13/11/2017</a:t>
+              <a:t>22/11/2017</a:t>
             </a:fld>
             <a:endParaRPr lang="fr-BE"/>
           </a:p>
@@ -820,7 +821,7 @@
           <a:p>
             <a:fld id="{AA309A6D-C09C-4548-B29A-6CF363A7E532}" type="datetimeFigureOut">
               <a:rPr lang="fr-FR" smtClean="0"/>
-              <a:t>13/11/2017</a:t>
+              <a:t>22/11/2017</a:t>
             </a:fld>
             <a:endParaRPr lang="fr-BE"/>
           </a:p>
@@ -1061,7 +1062,7 @@
           <a:p>
             <a:fld id="{AA309A6D-C09C-4548-B29A-6CF363A7E532}" type="datetimeFigureOut">
               <a:rPr lang="fr-FR" smtClean="0"/>
-              <a:t>13/11/2017</a:t>
+              <a:t>22/11/2017</a:t>
             </a:fld>
             <a:endParaRPr lang="fr-BE"/>
           </a:p>
@@ -1344,7 +1345,7 @@
           <a:p>
             <a:fld id="{AA309A6D-C09C-4548-B29A-6CF363A7E532}" type="datetimeFigureOut">
               <a:rPr lang="fr-FR" smtClean="0"/>
-              <a:t>13/11/2017</a:t>
+              <a:t>22/11/2017</a:t>
             </a:fld>
             <a:endParaRPr lang="fr-BE"/>
           </a:p>
@@ -1761,7 +1762,7 @@
           <a:p>
             <a:fld id="{AA309A6D-C09C-4548-B29A-6CF363A7E532}" type="datetimeFigureOut">
               <a:rPr lang="fr-FR" smtClean="0"/>
-              <a:t>13/11/2017</a:t>
+              <a:t>22/11/2017</a:t>
             </a:fld>
             <a:endParaRPr lang="fr-BE"/>
           </a:p>
@@ -1874,7 +1875,7 @@
           <a:p>
             <a:fld id="{AA309A6D-C09C-4548-B29A-6CF363A7E532}" type="datetimeFigureOut">
               <a:rPr lang="fr-FR" smtClean="0"/>
-              <a:t>13/11/2017</a:t>
+              <a:t>22/11/2017</a:t>
             </a:fld>
             <a:endParaRPr lang="fr-BE"/>
           </a:p>
@@ -1964,7 +1965,7 @@
           <a:p>
             <a:fld id="{AA309A6D-C09C-4548-B29A-6CF363A7E532}" type="datetimeFigureOut">
               <a:rPr lang="fr-FR" smtClean="0"/>
-              <a:t>13/11/2017</a:t>
+              <a:t>22/11/2017</a:t>
             </a:fld>
             <a:endParaRPr lang="fr-BE"/>
           </a:p>
@@ -2236,7 +2237,7 @@
           <a:p>
             <a:fld id="{AA309A6D-C09C-4548-B29A-6CF363A7E532}" type="datetimeFigureOut">
               <a:rPr lang="fr-FR" smtClean="0"/>
-              <a:t>13/11/2017</a:t>
+              <a:t>22/11/2017</a:t>
             </a:fld>
             <a:endParaRPr lang="fr-BE"/>
           </a:p>
@@ -2484,7 +2485,7 @@
           <a:p>
             <a:fld id="{AA309A6D-C09C-4548-B29A-6CF363A7E532}" type="datetimeFigureOut">
               <a:rPr lang="fr-FR" smtClean="0"/>
-              <a:t>13/11/2017</a:t>
+              <a:t>22/11/2017</a:t>
             </a:fld>
             <a:endParaRPr lang="fr-BE"/>
           </a:p>
@@ -2692,7 +2693,7 @@
           <a:p>
             <a:fld id="{AA309A6D-C09C-4548-B29A-6CF363A7E532}" type="datetimeFigureOut">
               <a:rPr lang="fr-FR" smtClean="0"/>
-              <a:t>13/11/2017</a:t>
+              <a:t>22/11/2017</a:t>
             </a:fld>
             <a:endParaRPr lang="fr-BE"/>
           </a:p>
@@ -5375,7 +5376,7 @@
                   </a:schemeClr>
                 </a:solidFill>
               </a:rPr>
-              <a:t>BED_UPDATE_ACTIVE_LAYER_HIRANO.f</a:t>
+              <a:t>UPDATE_ACTIVE_LAYER_HIRANO.f</a:t>
             </a:r>
             <a:r>
               <a:rPr lang="fr-FR" sz="1200" dirty="0" smtClean="0">
@@ -6508,25 +6509,8 @@
                   </a:schemeClr>
                 </a:solidFill>
               </a:rPr>
-              <a:t>  SEND TO TELEMAC3D (</a:t>
-            </a:r>
-            <a:r>
-              <a:rPr lang="fr-FR" sz="1200" dirty="0" smtClean="0">
-                <a:solidFill>
-                  <a:schemeClr val="accent3">
-                    <a:lumMod val="75000"/>
-                  </a:schemeClr>
-                </a:solidFill>
-              </a:rPr>
-              <a:t>FLUER + FLUDPT)</a:t>
-            </a:r>
-            <a:endParaRPr lang="fr-FR" sz="1200" dirty="0" smtClean="0">
-              <a:solidFill>
-                <a:schemeClr val="accent3">
-                  <a:lumMod val="75000"/>
-                </a:schemeClr>
-              </a:solidFill>
-            </a:endParaRPr>
+              <a:t>  SEND TO TELEMAC3D (FLUER + FLUDPT)</a:t>
+            </a:r>
           </a:p>
           <a:p>
             <a:r>
@@ -7347,6 +7331,1689 @@
     <p:extLst>
       <p:ext uri="{BB962C8B-B14F-4D97-AF65-F5344CB8AC3E}">
         <p14:creationId xmlns:p14="http://schemas.microsoft.com/office/powerpoint/2010/main" val="89339560"/>
+      </p:ext>
+    </p:extLst>
+  </p:cSld>
+  <p:clrMapOvr>
+    <a:masterClrMapping/>
+  </p:clrMapOvr>
+  <p:timing>
+    <p:tnLst>
+      <p:par>
+        <p:cTn id="1" dur="indefinite" restart="never" nodeType="tmRoot"/>
+      </p:par>
+    </p:tnLst>
+  </p:timing>
+</p:sld>
+</file>
+
+<file path=ppt/slides/slide13.xml><?xml version="1.0" encoding="utf-8"?>
+<p:sld xmlns:a="http://schemas.openxmlformats.org/drawingml/2006/main" xmlns:r="http://schemas.openxmlformats.org/officeDocument/2006/relationships" xmlns:p="http://schemas.openxmlformats.org/presentationml/2006/main">
+  <p:cSld>
+    <p:spTree>
+      <p:nvGrpSpPr>
+        <p:cNvPr id="1" name=""/>
+        <p:cNvGrpSpPr/>
+        <p:nvPr/>
+      </p:nvGrpSpPr>
+      <p:grpSpPr>
+        <a:xfrm>
+          <a:off x="0" y="0"/>
+          <a:ext cx="0" cy="0"/>
+          <a:chOff x="0" y="0"/>
+          <a:chExt cx="0" cy="0"/>
+        </a:xfrm>
+      </p:grpSpPr>
+      <p:sp>
+        <p:nvSpPr>
+          <p:cNvPr id="4" name="Titre 1"/>
+          <p:cNvSpPr>
+            <a:spLocks noGrp="1"/>
+          </p:cNvSpPr>
+          <p:nvPr>
+            <p:ph type="title"/>
+          </p:nvPr>
+        </p:nvSpPr>
+        <p:spPr>
+          <a:xfrm>
+            <a:off x="2051720" y="192675"/>
+            <a:ext cx="4474840" cy="778098"/>
+          </a:xfrm>
+        </p:spPr>
+        <p:txBody>
+          <a:bodyPr/>
+          <a:lstStyle/>
+          <a:p>
+            <a:r>
+              <a:rPr lang="fr-FR" dirty="0" smtClean="0">
+                <a:solidFill>
+                  <a:schemeClr val="accent3"/>
+                </a:solidFill>
+              </a:rPr>
+              <a:t>INIT_</a:t>
+            </a:r>
+            <a:r>
+              <a:rPr lang="fr-FR" dirty="0">
+                <a:solidFill>
+                  <a:schemeClr val="accent3"/>
+                </a:solidFill>
+              </a:rPr>
+              <a:t>SEDIMENT</a:t>
+            </a:r>
+          </a:p>
+        </p:txBody>
+      </p:sp>
+      <p:sp>
+        <p:nvSpPr>
+          <p:cNvPr id="5" name="Espace réservé du contenu 2"/>
+          <p:cNvSpPr>
+            <a:spLocks noGrp="1"/>
+          </p:cNvSpPr>
+          <p:nvPr>
+            <p:ph idx="1"/>
+          </p:nvPr>
+        </p:nvSpPr>
+        <p:spPr>
+          <a:xfrm>
+            <a:off x="424156" y="970482"/>
+            <a:ext cx="8229600" cy="748680"/>
+          </a:xfrm>
+        </p:spPr>
+        <p:txBody>
+          <a:bodyPr>
+            <a:normAutofit/>
+          </a:bodyPr>
+          <a:lstStyle/>
+          <a:p>
+            <a:pPr marL="0" indent="0">
+              <a:buNone/>
+            </a:pPr>
+            <a:r>
+              <a:rPr lang="fr-FR" dirty="0" smtClean="0"/>
+              <a:t>Case A : 1 layer </a:t>
+            </a:r>
+            <a:r>
+              <a:rPr lang="fr-FR" dirty="0" err="1" smtClean="0"/>
+              <a:t>with</a:t>
+            </a:r>
+            <a:r>
+              <a:rPr lang="fr-FR" dirty="0" smtClean="0"/>
+              <a:t> 1 </a:t>
+            </a:r>
+            <a:r>
+              <a:rPr lang="fr-FR" dirty="0" err="1" smtClean="0"/>
+              <a:t>mud</a:t>
+            </a:r>
+            <a:r>
+              <a:rPr lang="fr-FR" dirty="0" smtClean="0"/>
+              <a:t> and 1 </a:t>
+            </a:r>
+            <a:r>
+              <a:rPr lang="fr-FR" dirty="0" err="1" smtClean="0"/>
+              <a:t>sand</a:t>
+            </a:r>
+            <a:endParaRPr lang="fr-FR" dirty="0"/>
+          </a:p>
+        </p:txBody>
+      </p:sp>
+      <mc:AlternateContent xmlns:mc="http://schemas.openxmlformats.org/markup-compatibility/2006" xmlns:a14="http://schemas.microsoft.com/office/drawing/2010/main">
+        <mc:Choice Requires="a14">
+          <p:sp>
+            <p:nvSpPr>
+              <p:cNvPr id="6" name="Espace réservé du contenu 2"/>
+              <p:cNvSpPr txBox="1">
+                <a:spLocks/>
+              </p:cNvSpPr>
+              <p:nvPr/>
+            </p:nvSpPr>
+            <p:spPr>
+              <a:xfrm>
+                <a:off x="424156" y="1579923"/>
+                <a:ext cx="8229600" cy="1933641"/>
+              </a:xfrm>
+              <a:prstGeom prst="rect">
+                <a:avLst/>
+              </a:prstGeom>
+            </p:spPr>
+            <p:txBody>
+              <a:bodyPr vert="horz" lIns="91440" tIns="45720" rIns="91440" bIns="45720" rtlCol="0">
+                <a:normAutofit fontScale="70000" lnSpcReduction="20000"/>
+              </a:bodyPr>
+              <a:lstStyle>
+                <a:lvl1pPr marL="342900" indent="-342900" algn="l" defTabSz="914400" rtl="0" eaLnBrk="1" latinLnBrk="0" hangingPunct="1">
+                  <a:spcBef>
+                    <a:spcPct val="20000"/>
+                  </a:spcBef>
+                  <a:buFont typeface="Arial" pitchFamily="34" charset="0"/>
+                  <a:buChar char="•"/>
+                  <a:defRPr sz="3200" kern="1200">
+                    <a:solidFill>
+                      <a:schemeClr val="tx1"/>
+                    </a:solidFill>
+                    <a:latin typeface="+mn-lt"/>
+                    <a:ea typeface="+mn-ea"/>
+                    <a:cs typeface="+mn-cs"/>
+                  </a:defRPr>
+                </a:lvl1pPr>
+                <a:lvl2pPr marL="742950" indent="-285750" algn="l" defTabSz="914400" rtl="0" eaLnBrk="1" latinLnBrk="0" hangingPunct="1">
+                  <a:spcBef>
+                    <a:spcPct val="20000"/>
+                  </a:spcBef>
+                  <a:buFont typeface="Arial" pitchFamily="34" charset="0"/>
+                  <a:buChar char="–"/>
+                  <a:defRPr sz="2800" kern="1200">
+                    <a:solidFill>
+                      <a:schemeClr val="tx1"/>
+                    </a:solidFill>
+                    <a:latin typeface="+mn-lt"/>
+                    <a:ea typeface="+mn-ea"/>
+                    <a:cs typeface="+mn-cs"/>
+                  </a:defRPr>
+                </a:lvl2pPr>
+                <a:lvl3pPr marL="1143000" indent="-228600" algn="l" defTabSz="914400" rtl="0" eaLnBrk="1" latinLnBrk="0" hangingPunct="1">
+                  <a:spcBef>
+                    <a:spcPct val="20000"/>
+                  </a:spcBef>
+                  <a:buFont typeface="Arial" pitchFamily="34" charset="0"/>
+                  <a:buChar char="•"/>
+                  <a:defRPr sz="2400" kern="1200">
+                    <a:solidFill>
+                      <a:schemeClr val="tx1"/>
+                    </a:solidFill>
+                    <a:latin typeface="+mn-lt"/>
+                    <a:ea typeface="+mn-ea"/>
+                    <a:cs typeface="+mn-cs"/>
+                  </a:defRPr>
+                </a:lvl3pPr>
+                <a:lvl4pPr marL="1600200" indent="-228600" algn="l" defTabSz="914400" rtl="0" eaLnBrk="1" latinLnBrk="0" hangingPunct="1">
+                  <a:spcBef>
+                    <a:spcPct val="20000"/>
+                  </a:spcBef>
+                  <a:buFont typeface="Arial" pitchFamily="34" charset="0"/>
+                  <a:buChar char="–"/>
+                  <a:defRPr sz="2000" kern="1200">
+                    <a:solidFill>
+                      <a:schemeClr val="tx1"/>
+                    </a:solidFill>
+                    <a:latin typeface="+mn-lt"/>
+                    <a:ea typeface="+mn-ea"/>
+                    <a:cs typeface="+mn-cs"/>
+                  </a:defRPr>
+                </a:lvl4pPr>
+                <a:lvl5pPr marL="2057400" indent="-228600" algn="l" defTabSz="914400" rtl="0" eaLnBrk="1" latinLnBrk="0" hangingPunct="1">
+                  <a:spcBef>
+                    <a:spcPct val="20000"/>
+                  </a:spcBef>
+                  <a:buFont typeface="Arial" pitchFamily="34" charset="0"/>
+                  <a:buChar char="»"/>
+                  <a:defRPr sz="2000" kern="1200">
+                    <a:solidFill>
+                      <a:schemeClr val="tx1"/>
+                    </a:solidFill>
+                    <a:latin typeface="+mn-lt"/>
+                    <a:ea typeface="+mn-ea"/>
+                    <a:cs typeface="+mn-cs"/>
+                  </a:defRPr>
+                </a:lvl5pPr>
+                <a:lvl6pPr marL="2514600" indent="-228600" algn="l" defTabSz="914400" rtl="0" eaLnBrk="1" latinLnBrk="0" hangingPunct="1">
+                  <a:spcBef>
+                    <a:spcPct val="20000"/>
+                  </a:spcBef>
+                  <a:buFont typeface="Arial" pitchFamily="34" charset="0"/>
+                  <a:buChar char="•"/>
+                  <a:defRPr sz="2000" kern="1200">
+                    <a:solidFill>
+                      <a:schemeClr val="tx1"/>
+                    </a:solidFill>
+                    <a:latin typeface="+mn-lt"/>
+                    <a:ea typeface="+mn-ea"/>
+                    <a:cs typeface="+mn-cs"/>
+                  </a:defRPr>
+                </a:lvl6pPr>
+                <a:lvl7pPr marL="2971800" indent="-228600" algn="l" defTabSz="914400" rtl="0" eaLnBrk="1" latinLnBrk="0" hangingPunct="1">
+                  <a:spcBef>
+                    <a:spcPct val="20000"/>
+                  </a:spcBef>
+                  <a:buFont typeface="Arial" pitchFamily="34" charset="0"/>
+                  <a:buChar char="•"/>
+                  <a:defRPr sz="2000" kern="1200">
+                    <a:solidFill>
+                      <a:schemeClr val="tx1"/>
+                    </a:solidFill>
+                    <a:latin typeface="+mn-lt"/>
+                    <a:ea typeface="+mn-ea"/>
+                    <a:cs typeface="+mn-cs"/>
+                  </a:defRPr>
+                </a:lvl7pPr>
+                <a:lvl8pPr marL="3429000" indent="-228600" algn="l" defTabSz="914400" rtl="0" eaLnBrk="1" latinLnBrk="0" hangingPunct="1">
+                  <a:spcBef>
+                    <a:spcPct val="20000"/>
+                  </a:spcBef>
+                  <a:buFont typeface="Arial" pitchFamily="34" charset="0"/>
+                  <a:buChar char="•"/>
+                  <a:defRPr sz="2000" kern="1200">
+                    <a:solidFill>
+                      <a:schemeClr val="tx1"/>
+                    </a:solidFill>
+                    <a:latin typeface="+mn-lt"/>
+                    <a:ea typeface="+mn-ea"/>
+                    <a:cs typeface="+mn-cs"/>
+                  </a:defRPr>
+                </a:lvl8pPr>
+                <a:lvl9pPr marL="3886200" indent="-228600" algn="l" defTabSz="914400" rtl="0" eaLnBrk="1" latinLnBrk="0" hangingPunct="1">
+                  <a:spcBef>
+                    <a:spcPct val="20000"/>
+                  </a:spcBef>
+                  <a:buFont typeface="Arial" pitchFamily="34" charset="0"/>
+                  <a:buChar char="•"/>
+                  <a:defRPr sz="2000" kern="1200">
+                    <a:solidFill>
+                      <a:schemeClr val="tx1"/>
+                    </a:solidFill>
+                    <a:latin typeface="+mn-lt"/>
+                    <a:ea typeface="+mn-ea"/>
+                    <a:cs typeface="+mn-cs"/>
+                  </a:defRPr>
+                </a:lvl9pPr>
+              </a:lstStyle>
+              <a:p>
+                <a:pPr marL="0" indent="0">
+                  <a:buFont typeface="Arial" pitchFamily="34" charset="0"/>
+                  <a:buNone/>
+                </a:pPr>
+                <a:r>
+                  <a:rPr lang="fr-FR" dirty="0" smtClean="0"/>
+                  <a:t>1) The user </a:t>
+                </a:r>
+                <a:r>
+                  <a:rPr lang="fr-FR" dirty="0" err="1" smtClean="0"/>
+                  <a:t>gives</a:t>
+                </a:r>
+                <a:r>
+                  <a:rPr lang="fr-FR" dirty="0" smtClean="0"/>
+                  <a:t> for </a:t>
+                </a:r>
+                <a:r>
+                  <a:rPr lang="fr-FR" dirty="0" err="1" smtClean="0"/>
+                  <a:t>every</a:t>
+                </a:r>
+                <a:r>
+                  <a:rPr lang="fr-FR" dirty="0" smtClean="0"/>
+                  <a:t> layer (</a:t>
+                </a:r>
+                <a:r>
+                  <a:rPr lang="fr-FR" dirty="0" err="1" smtClean="0"/>
+                  <a:t>here</a:t>
+                </a:r>
+                <a:r>
+                  <a:rPr lang="fr-FR" dirty="0" smtClean="0"/>
+                  <a:t> </a:t>
+                </a:r>
+                <a:r>
+                  <a:rPr lang="fr-FR" dirty="0" err="1" smtClean="0"/>
+                  <a:t>just</a:t>
+                </a:r>
+                <a:r>
+                  <a:rPr lang="fr-FR" dirty="0" smtClean="0"/>
+                  <a:t> 1 layer):</a:t>
+                </a:r>
+              </a:p>
+              <a:p>
+                <a:r>
+                  <a:rPr lang="fr-FR" dirty="0" smtClean="0"/>
+                  <a:t>The </a:t>
+                </a:r>
+                <a:r>
+                  <a:rPr lang="fr-FR" dirty="0" err="1" smtClean="0"/>
+                  <a:t>thickness</a:t>
+                </a:r>
+                <a:r>
+                  <a:rPr lang="fr-FR" dirty="0" smtClean="0"/>
+                  <a:t> : </a:t>
+                </a:r>
+                <a:r>
+                  <a:rPr lang="fr-FR" b="1" dirty="0" smtClean="0"/>
+                  <a:t>ES</a:t>
+                </a:r>
+                <a:r>
+                  <a:rPr lang="fr-FR" dirty="0" smtClean="0"/>
+                  <a:t>  in [m]</a:t>
+                </a:r>
+              </a:p>
+              <a:p>
+                <a:r>
+                  <a:rPr lang="fr-FR" dirty="0" smtClean="0"/>
+                  <a:t>The ratio of the </a:t>
+                </a:r>
+                <a:r>
+                  <a:rPr lang="fr-FR" dirty="0" err="1" smtClean="0"/>
+                  <a:t>mud</a:t>
+                </a:r>
+                <a:r>
+                  <a:rPr lang="fr-FR" dirty="0" smtClean="0"/>
+                  <a:t> over the </a:t>
+                </a:r>
+                <a:r>
+                  <a:rPr lang="fr-FR" dirty="0" err="1" smtClean="0"/>
+                  <a:t>sand</a:t>
+                </a:r>
+                <a:r>
+                  <a:rPr lang="fr-FR" dirty="0" smtClean="0"/>
+                  <a:t>: </a:t>
+                </a:r>
+                <a:r>
+                  <a:rPr lang="fr-FR" b="1" dirty="0" smtClean="0"/>
+                  <a:t>RATIO_MUD_SAND</a:t>
+                </a:r>
+                <a:r>
+                  <a:rPr lang="fr-FR" dirty="0" smtClean="0"/>
+                  <a:t> in [/]</a:t>
+                </a:r>
+              </a:p>
+              <a:p>
+                <a:pPr lvl="1"/>
+                <a:r>
+                  <a:rPr lang="fr-FR" dirty="0" smtClean="0"/>
+                  <a:t>It corresponds to the ratio </a:t>
+                </a:r>
+                <a14:m>
+                  <m:oMath xmlns:m="http://schemas.openxmlformats.org/officeDocument/2006/math">
+                    <m:sSub>
+                      <m:sSubPr>
+                        <m:ctrlPr>
+                          <a:rPr lang="fr-FR" b="0" i="1" smtClean="0">
+                            <a:latin typeface="Cambria Math" panose="02040503050406030204" pitchFamily="18" charset="0"/>
+                          </a:rPr>
+                        </m:ctrlPr>
+                      </m:sSubPr>
+                      <m:e>
+                        <m:r>
+                          <a:rPr lang="fr-FR" i="1" smtClean="0">
+                            <a:latin typeface="Cambria Math" panose="02040503050406030204" pitchFamily="18" charset="0"/>
+                          </a:rPr>
+                          <m:t>𝑅</m:t>
+                        </m:r>
+                      </m:e>
+                      <m:sub>
+                        <m:r>
+                          <a:rPr lang="fr-FR" b="0" i="1" smtClean="0">
+                            <a:latin typeface="Cambria Math" panose="02040503050406030204" pitchFamily="18" charset="0"/>
+                          </a:rPr>
+                          <m:t>𝑀</m:t>
+                        </m:r>
+                      </m:sub>
+                    </m:sSub>
+                    <m:r>
+                      <a:rPr lang="fr-FR" b="0" i="1" smtClean="0">
+                        <a:latin typeface="Cambria Math" panose="02040503050406030204" pitchFamily="18" charset="0"/>
+                      </a:rPr>
+                      <m:t>=</m:t>
+                    </m:r>
+                    <m:f>
+                      <m:fPr>
+                        <m:ctrlPr>
+                          <a:rPr lang="fr-FR" b="0" i="1" smtClean="0">
+                            <a:latin typeface="Cambria Math" panose="02040503050406030204" pitchFamily="18" charset="0"/>
+                          </a:rPr>
+                        </m:ctrlPr>
+                      </m:fPr>
+                      <m:num>
+                        <m:r>
+                          <a:rPr lang="fr-FR" b="0" i="1" smtClean="0">
+                            <a:latin typeface="Cambria Math" panose="02040503050406030204" pitchFamily="18" charset="0"/>
+                          </a:rPr>
+                          <m:t>𝑀𝑎𝑠𝑠</m:t>
+                        </m:r>
+                        <m:r>
+                          <a:rPr lang="fr-FR" b="0" i="1" smtClean="0">
+                            <a:latin typeface="Cambria Math" panose="02040503050406030204" pitchFamily="18" charset="0"/>
+                          </a:rPr>
+                          <m:t>_</m:t>
+                        </m:r>
+                        <m:r>
+                          <a:rPr lang="fr-FR" b="0" i="1" smtClean="0">
+                            <a:latin typeface="Cambria Math" panose="02040503050406030204" pitchFamily="18" charset="0"/>
+                          </a:rPr>
+                          <m:t>𝑀𝑈𝐷</m:t>
+                        </m:r>
+                      </m:num>
+                      <m:den>
+                        <m:r>
+                          <a:rPr lang="fr-FR" b="0" i="1" smtClean="0">
+                            <a:latin typeface="Cambria Math" panose="02040503050406030204" pitchFamily="18" charset="0"/>
+                          </a:rPr>
+                          <m:t>𝑀𝑎𝑠𝑠</m:t>
+                        </m:r>
+                        <m:r>
+                          <a:rPr lang="fr-FR" b="0" i="1" smtClean="0">
+                            <a:latin typeface="Cambria Math" panose="02040503050406030204" pitchFamily="18" charset="0"/>
+                          </a:rPr>
+                          <m:t>_</m:t>
+                        </m:r>
+                        <m:r>
+                          <a:rPr lang="fr-FR" b="0" i="1" smtClean="0">
+                            <a:latin typeface="Cambria Math" panose="02040503050406030204" pitchFamily="18" charset="0"/>
+                          </a:rPr>
+                          <m:t>𝑇𝑂𝑇</m:t>
+                        </m:r>
+                      </m:den>
+                    </m:f>
+                  </m:oMath>
+                </a14:m>
+                <a:r>
+                  <a:rPr lang="fr-FR" dirty="0" smtClean="0"/>
+                  <a:t> </a:t>
+                </a:r>
+              </a:p>
+              <a:p>
+                <a:pPr marL="457200" lvl="1" indent="0">
+                  <a:buNone/>
+                </a:pPr>
+                <a:endParaRPr lang="fr-FR" dirty="0"/>
+              </a:p>
+            </p:txBody>
+          </p:sp>
+        </mc:Choice>
+        <mc:Fallback xmlns="">
+          <p:sp>
+            <p:nvSpPr>
+              <p:cNvPr id="6" name="Espace réservé du contenu 2"/>
+              <p:cNvSpPr txBox="1">
+                <a:spLocks noRot="1" noChangeAspect="1" noMove="1" noResize="1" noEditPoints="1" noAdjustHandles="1" noChangeArrowheads="1" noChangeShapeType="1" noTextEdit="1"/>
+              </p:cNvSpPr>
+              <p:nvPr/>
+            </p:nvSpPr>
+            <p:spPr>
+              <a:xfrm>
+                <a:off x="424156" y="1579923"/>
+                <a:ext cx="8229600" cy="1933641"/>
+              </a:xfrm>
+              <a:prstGeom prst="rect">
+                <a:avLst/>
+              </a:prstGeom>
+              <a:blipFill rotWithShape="0">
+                <a:blip r:embed="rId2"/>
+                <a:stretch>
+                  <a:fillRect l="-963" t="-5363"/>
+                </a:stretch>
+              </a:blipFill>
+            </p:spPr>
+            <p:txBody>
+              <a:bodyPr/>
+              <a:lstStyle/>
+              <a:p>
+                <a:r>
+                  <a:rPr lang="fr-FR">
+                    <a:noFill/>
+                  </a:rPr>
+                  <a:t> </a:t>
+                </a:r>
+              </a:p>
+            </p:txBody>
+          </p:sp>
+        </mc:Fallback>
+      </mc:AlternateContent>
+      <mc:AlternateContent xmlns:mc="http://schemas.openxmlformats.org/markup-compatibility/2006" xmlns:a14="http://schemas.microsoft.com/office/drawing/2010/main">
+        <mc:Choice Requires="a14">
+          <p:sp>
+            <p:nvSpPr>
+              <p:cNvPr id="7" name="Espace réservé du contenu 2"/>
+              <p:cNvSpPr txBox="1">
+                <a:spLocks/>
+              </p:cNvSpPr>
+              <p:nvPr/>
+            </p:nvSpPr>
+            <p:spPr>
+              <a:xfrm>
+                <a:off x="381280" y="3068960"/>
+                <a:ext cx="8229600" cy="3672408"/>
+              </a:xfrm>
+              <a:prstGeom prst="rect">
+                <a:avLst/>
+              </a:prstGeom>
+            </p:spPr>
+            <p:txBody>
+              <a:bodyPr vert="horz" lIns="91440" tIns="45720" rIns="91440" bIns="45720" rtlCol="0">
+                <a:normAutofit fontScale="55000" lnSpcReduction="20000"/>
+              </a:bodyPr>
+              <a:lstStyle>
+                <a:lvl1pPr marL="342900" indent="-342900" algn="l" defTabSz="914400" rtl="0" eaLnBrk="1" latinLnBrk="0" hangingPunct="1">
+                  <a:spcBef>
+                    <a:spcPct val="20000"/>
+                  </a:spcBef>
+                  <a:buFont typeface="Arial" pitchFamily="34" charset="0"/>
+                  <a:buChar char="•"/>
+                  <a:defRPr sz="3200" kern="1200">
+                    <a:solidFill>
+                      <a:schemeClr val="tx1"/>
+                    </a:solidFill>
+                    <a:latin typeface="+mn-lt"/>
+                    <a:ea typeface="+mn-ea"/>
+                    <a:cs typeface="+mn-cs"/>
+                  </a:defRPr>
+                </a:lvl1pPr>
+                <a:lvl2pPr marL="742950" indent="-285750" algn="l" defTabSz="914400" rtl="0" eaLnBrk="1" latinLnBrk="0" hangingPunct="1">
+                  <a:spcBef>
+                    <a:spcPct val="20000"/>
+                  </a:spcBef>
+                  <a:buFont typeface="Arial" pitchFamily="34" charset="0"/>
+                  <a:buChar char="–"/>
+                  <a:defRPr sz="2800" kern="1200">
+                    <a:solidFill>
+                      <a:schemeClr val="tx1"/>
+                    </a:solidFill>
+                    <a:latin typeface="+mn-lt"/>
+                    <a:ea typeface="+mn-ea"/>
+                    <a:cs typeface="+mn-cs"/>
+                  </a:defRPr>
+                </a:lvl2pPr>
+                <a:lvl3pPr marL="1143000" indent="-228600" algn="l" defTabSz="914400" rtl="0" eaLnBrk="1" latinLnBrk="0" hangingPunct="1">
+                  <a:spcBef>
+                    <a:spcPct val="20000"/>
+                  </a:spcBef>
+                  <a:buFont typeface="Arial" pitchFamily="34" charset="0"/>
+                  <a:buChar char="•"/>
+                  <a:defRPr sz="2400" kern="1200">
+                    <a:solidFill>
+                      <a:schemeClr val="tx1"/>
+                    </a:solidFill>
+                    <a:latin typeface="+mn-lt"/>
+                    <a:ea typeface="+mn-ea"/>
+                    <a:cs typeface="+mn-cs"/>
+                  </a:defRPr>
+                </a:lvl3pPr>
+                <a:lvl4pPr marL="1600200" indent="-228600" algn="l" defTabSz="914400" rtl="0" eaLnBrk="1" latinLnBrk="0" hangingPunct="1">
+                  <a:spcBef>
+                    <a:spcPct val="20000"/>
+                  </a:spcBef>
+                  <a:buFont typeface="Arial" pitchFamily="34" charset="0"/>
+                  <a:buChar char="–"/>
+                  <a:defRPr sz="2000" kern="1200">
+                    <a:solidFill>
+                      <a:schemeClr val="tx1"/>
+                    </a:solidFill>
+                    <a:latin typeface="+mn-lt"/>
+                    <a:ea typeface="+mn-ea"/>
+                    <a:cs typeface="+mn-cs"/>
+                  </a:defRPr>
+                </a:lvl4pPr>
+                <a:lvl5pPr marL="2057400" indent="-228600" algn="l" defTabSz="914400" rtl="0" eaLnBrk="1" latinLnBrk="0" hangingPunct="1">
+                  <a:spcBef>
+                    <a:spcPct val="20000"/>
+                  </a:spcBef>
+                  <a:buFont typeface="Arial" pitchFamily="34" charset="0"/>
+                  <a:buChar char="»"/>
+                  <a:defRPr sz="2000" kern="1200">
+                    <a:solidFill>
+                      <a:schemeClr val="tx1"/>
+                    </a:solidFill>
+                    <a:latin typeface="+mn-lt"/>
+                    <a:ea typeface="+mn-ea"/>
+                    <a:cs typeface="+mn-cs"/>
+                  </a:defRPr>
+                </a:lvl5pPr>
+                <a:lvl6pPr marL="2514600" indent="-228600" algn="l" defTabSz="914400" rtl="0" eaLnBrk="1" latinLnBrk="0" hangingPunct="1">
+                  <a:spcBef>
+                    <a:spcPct val="20000"/>
+                  </a:spcBef>
+                  <a:buFont typeface="Arial" pitchFamily="34" charset="0"/>
+                  <a:buChar char="•"/>
+                  <a:defRPr sz="2000" kern="1200">
+                    <a:solidFill>
+                      <a:schemeClr val="tx1"/>
+                    </a:solidFill>
+                    <a:latin typeface="+mn-lt"/>
+                    <a:ea typeface="+mn-ea"/>
+                    <a:cs typeface="+mn-cs"/>
+                  </a:defRPr>
+                </a:lvl6pPr>
+                <a:lvl7pPr marL="2971800" indent="-228600" algn="l" defTabSz="914400" rtl="0" eaLnBrk="1" latinLnBrk="0" hangingPunct="1">
+                  <a:spcBef>
+                    <a:spcPct val="20000"/>
+                  </a:spcBef>
+                  <a:buFont typeface="Arial" pitchFamily="34" charset="0"/>
+                  <a:buChar char="•"/>
+                  <a:defRPr sz="2000" kern="1200">
+                    <a:solidFill>
+                      <a:schemeClr val="tx1"/>
+                    </a:solidFill>
+                    <a:latin typeface="+mn-lt"/>
+                    <a:ea typeface="+mn-ea"/>
+                    <a:cs typeface="+mn-cs"/>
+                  </a:defRPr>
+                </a:lvl7pPr>
+                <a:lvl8pPr marL="3429000" indent="-228600" algn="l" defTabSz="914400" rtl="0" eaLnBrk="1" latinLnBrk="0" hangingPunct="1">
+                  <a:spcBef>
+                    <a:spcPct val="20000"/>
+                  </a:spcBef>
+                  <a:buFont typeface="Arial" pitchFamily="34" charset="0"/>
+                  <a:buChar char="•"/>
+                  <a:defRPr sz="2000" kern="1200">
+                    <a:solidFill>
+                      <a:schemeClr val="tx1"/>
+                    </a:solidFill>
+                    <a:latin typeface="+mn-lt"/>
+                    <a:ea typeface="+mn-ea"/>
+                    <a:cs typeface="+mn-cs"/>
+                  </a:defRPr>
+                </a:lvl8pPr>
+                <a:lvl9pPr marL="3886200" indent="-228600" algn="l" defTabSz="914400" rtl="0" eaLnBrk="1" latinLnBrk="0" hangingPunct="1">
+                  <a:spcBef>
+                    <a:spcPct val="20000"/>
+                  </a:spcBef>
+                  <a:buFont typeface="Arial" pitchFamily="34" charset="0"/>
+                  <a:buChar char="•"/>
+                  <a:defRPr sz="2000" kern="1200">
+                    <a:solidFill>
+                      <a:schemeClr val="tx1"/>
+                    </a:solidFill>
+                    <a:latin typeface="+mn-lt"/>
+                    <a:ea typeface="+mn-ea"/>
+                    <a:cs typeface="+mn-cs"/>
+                  </a:defRPr>
+                </a:lvl9pPr>
+              </a:lstStyle>
+              <a:p>
+                <a:pPr marL="0" indent="0">
+                  <a:buFont typeface="Arial" pitchFamily="34" charset="0"/>
+                  <a:buNone/>
+                </a:pPr>
+                <a:r>
+                  <a:rPr lang="fr-FR" dirty="0" smtClean="0"/>
+                  <a:t>2) Sisyphe </a:t>
+                </a:r>
+                <a:r>
+                  <a:rPr lang="fr-FR" dirty="0" err="1" smtClean="0"/>
+                  <a:t>computes</a:t>
+                </a:r>
+                <a:r>
+                  <a:rPr lang="fr-FR" dirty="0" smtClean="0"/>
+                  <a:t> the masses, </a:t>
+                </a:r>
+                <a:r>
+                  <a:rPr lang="fr-FR" dirty="0" err="1" smtClean="0"/>
+                  <a:t>using</a:t>
+                </a:r>
+                <a:r>
+                  <a:rPr lang="fr-FR" dirty="0" smtClean="0"/>
+                  <a:t> </a:t>
+                </a:r>
+                <a:r>
+                  <a:rPr lang="fr-FR" dirty="0" err="1" smtClean="0"/>
+                  <a:t>other</a:t>
+                </a:r>
+                <a:r>
+                  <a:rPr lang="fr-FR" dirty="0" smtClean="0"/>
+                  <a:t> </a:t>
+                </a:r>
+                <a:r>
+                  <a:rPr lang="fr-FR" dirty="0" err="1" smtClean="0"/>
+                  <a:t>parameters</a:t>
+                </a:r>
+                <a:r>
+                  <a:rPr lang="fr-FR" dirty="0" smtClean="0"/>
+                  <a:t> </a:t>
+                </a:r>
+                <a:r>
+                  <a:rPr lang="fr-FR" dirty="0" err="1" smtClean="0"/>
+                  <a:t>given</a:t>
+                </a:r>
+                <a:r>
+                  <a:rPr lang="fr-FR" dirty="0" smtClean="0"/>
+                  <a:t> in the </a:t>
+                </a:r>
+                <a:r>
+                  <a:rPr lang="fr-FR" dirty="0" err="1" smtClean="0"/>
+                  <a:t>steering</a:t>
+                </a:r>
+                <a:r>
+                  <a:rPr lang="fr-FR" dirty="0" smtClean="0"/>
+                  <a:t> file : </a:t>
+                </a:r>
+              </a:p>
+              <a:p>
+                <a:r>
+                  <a:rPr lang="fr-FR" dirty="0" err="1" smtClean="0"/>
+                  <a:t>Sediment</a:t>
+                </a:r>
+                <a:r>
+                  <a:rPr lang="fr-FR" dirty="0" smtClean="0"/>
+                  <a:t> </a:t>
+                </a:r>
+                <a:r>
+                  <a:rPr lang="fr-FR" dirty="0" err="1" smtClean="0"/>
+                  <a:t>density</a:t>
+                </a:r>
+                <a:r>
+                  <a:rPr lang="fr-FR" dirty="0" smtClean="0"/>
+                  <a:t> </a:t>
+                </a:r>
+                <a:r>
+                  <a:rPr lang="fr-FR" b="1" dirty="0" smtClean="0"/>
+                  <a:t>XKVS</a:t>
+                </a:r>
+                <a:r>
+                  <a:rPr lang="fr-FR" dirty="0" smtClean="0"/>
+                  <a:t> :</a:t>
+                </a:r>
+                <a:r>
+                  <a:rPr lang="fr-FR" dirty="0">
+                    <a:ea typeface="Cambria Math" panose="02040503050406030204" pitchFamily="18" charset="0"/>
+                  </a:rPr>
+                  <a:t> </a:t>
+                </a:r>
+                <a14:m>
+                  <m:oMath xmlns:m="http://schemas.openxmlformats.org/officeDocument/2006/math">
+                    <m:sSub>
+                      <m:sSubPr>
+                        <m:ctrlPr>
+                          <a:rPr lang="fr-FR" i="1">
+                            <a:latin typeface="Cambria Math" panose="02040503050406030204" pitchFamily="18" charset="0"/>
+                            <a:ea typeface="Cambria Math" panose="02040503050406030204" pitchFamily="18" charset="0"/>
+                          </a:rPr>
+                        </m:ctrlPr>
+                      </m:sSubPr>
+                      <m:e>
+                        <m:r>
+                          <a:rPr lang="fr-FR" i="1">
+                            <a:latin typeface="Cambria Math" panose="02040503050406030204" pitchFamily="18" charset="0"/>
+                            <a:ea typeface="Cambria Math" panose="02040503050406030204" pitchFamily="18" charset="0"/>
+                          </a:rPr>
+                          <m:t>𝜌</m:t>
+                        </m:r>
+                      </m:e>
+                      <m:sub>
+                        <m:r>
+                          <a:rPr lang="fr-FR" b="0" i="1" smtClean="0">
+                            <a:latin typeface="Cambria Math" panose="02040503050406030204" pitchFamily="18" charset="0"/>
+                            <a:ea typeface="Cambria Math" panose="02040503050406030204" pitchFamily="18" charset="0"/>
+                          </a:rPr>
+                          <m:t>𝑆𝐴𝑁𝐷</m:t>
+                        </m:r>
+                      </m:sub>
+                    </m:sSub>
+                  </m:oMath>
+                </a14:m>
+                <a:r>
+                  <a:rPr lang="fr-FR" dirty="0" smtClean="0"/>
+                  <a:t>  in [kg/m^3] </a:t>
+                </a:r>
+                <a:r>
+                  <a:rPr lang="fr-FR" dirty="0" err="1" smtClean="0"/>
+                  <a:t>which</a:t>
+                </a:r>
+                <a:r>
+                  <a:rPr lang="fr-FR" dirty="0" smtClean="0"/>
+                  <a:t> </a:t>
+                </a:r>
+                <a:r>
+                  <a:rPr lang="fr-FR" dirty="0" err="1" smtClean="0"/>
+                  <a:t>is</a:t>
+                </a:r>
+                <a:r>
+                  <a:rPr lang="fr-FR" dirty="0" smtClean="0"/>
+                  <a:t> the </a:t>
+                </a:r>
+                <a:r>
+                  <a:rPr lang="fr-FR" dirty="0" err="1" smtClean="0"/>
+                  <a:t>sand</a:t>
+                </a:r>
+                <a:r>
+                  <a:rPr lang="fr-FR" dirty="0" smtClean="0"/>
+                  <a:t> </a:t>
+                </a:r>
+                <a:r>
+                  <a:rPr lang="fr-FR" dirty="0" err="1" smtClean="0"/>
+                  <a:t>density</a:t>
+                </a:r>
+                <a:endParaRPr lang="fr-FR" dirty="0" smtClean="0"/>
+              </a:p>
+              <a:p>
+                <a:r>
+                  <a:rPr lang="fr-FR" dirty="0" err="1" smtClean="0"/>
+                  <a:t>Mud</a:t>
+                </a:r>
+                <a:r>
+                  <a:rPr lang="fr-FR" dirty="0" smtClean="0"/>
+                  <a:t> </a:t>
+                </a:r>
+                <a:r>
+                  <a:rPr lang="fr-FR" dirty="0" err="1" smtClean="0"/>
+                  <a:t>density</a:t>
+                </a:r>
+                <a:r>
+                  <a:rPr lang="fr-FR" dirty="0" smtClean="0"/>
+                  <a:t> </a:t>
+                </a:r>
+                <a:r>
+                  <a:rPr lang="fr-FR" b="1" dirty="0" smtClean="0"/>
+                  <a:t>CONC_VASE</a:t>
+                </a:r>
+                <a:r>
+                  <a:rPr lang="fr-FR" dirty="0" smtClean="0"/>
+                  <a:t> : </a:t>
+                </a:r>
+                <a14:m>
+                  <m:oMath xmlns:m="http://schemas.openxmlformats.org/officeDocument/2006/math">
+                    <m:sSub>
+                      <m:sSubPr>
+                        <m:ctrlPr>
+                          <a:rPr lang="fr-FR" i="1">
+                            <a:latin typeface="Cambria Math" panose="02040503050406030204" pitchFamily="18" charset="0"/>
+                            <a:ea typeface="Cambria Math" panose="02040503050406030204" pitchFamily="18" charset="0"/>
+                          </a:rPr>
+                        </m:ctrlPr>
+                      </m:sSubPr>
+                      <m:e>
+                        <m:r>
+                          <a:rPr lang="fr-FR" i="1">
+                            <a:latin typeface="Cambria Math" panose="02040503050406030204" pitchFamily="18" charset="0"/>
+                            <a:ea typeface="Cambria Math" panose="02040503050406030204" pitchFamily="18" charset="0"/>
+                          </a:rPr>
+                          <m:t>𝜌</m:t>
+                        </m:r>
+                      </m:e>
+                      <m:sub>
+                        <m:r>
+                          <a:rPr lang="fr-FR" b="0" i="1" smtClean="0">
+                            <a:latin typeface="Cambria Math" panose="02040503050406030204" pitchFamily="18" charset="0"/>
+                            <a:ea typeface="Cambria Math" panose="02040503050406030204" pitchFamily="18" charset="0"/>
+                          </a:rPr>
+                          <m:t>𝑀𝑈𝐷</m:t>
+                        </m:r>
+                      </m:sub>
+                    </m:sSub>
+                  </m:oMath>
+                </a14:m>
+                <a:r>
+                  <a:rPr lang="fr-FR" dirty="0" smtClean="0"/>
+                  <a:t>in [kg/m^3]</a:t>
+                </a:r>
+              </a:p>
+              <a:p>
+                <a:r>
+                  <a:rPr lang="fr-FR" dirty="0" err="1" smtClean="0"/>
+                  <a:t>Bed</a:t>
+                </a:r>
+                <a:r>
+                  <a:rPr lang="fr-FR" dirty="0" smtClean="0"/>
+                  <a:t> </a:t>
+                </a:r>
+                <a:r>
+                  <a:rPr lang="fr-FR" dirty="0" err="1" smtClean="0"/>
+                  <a:t>porosity</a:t>
+                </a:r>
+                <a:r>
+                  <a:rPr lang="fr-FR" dirty="0" smtClean="0"/>
+                  <a:t> </a:t>
+                </a:r>
+                <a:r>
+                  <a:rPr lang="fr-FR" b="1" dirty="0" smtClean="0"/>
+                  <a:t>XKV</a:t>
+                </a:r>
+                <a:r>
+                  <a:rPr lang="fr-FR" dirty="0" smtClean="0"/>
+                  <a:t> in [/] </a:t>
+                </a:r>
+                <a:r>
+                  <a:rPr lang="fr-FR" dirty="0" err="1" smtClean="0"/>
+                  <a:t>which</a:t>
+                </a:r>
+                <a:r>
+                  <a:rPr lang="fr-FR" dirty="0" smtClean="0"/>
+                  <a:t> </a:t>
+                </a:r>
+                <a:r>
+                  <a:rPr lang="fr-FR" dirty="0" err="1" smtClean="0"/>
+                  <a:t>is</a:t>
+                </a:r>
+                <a:r>
+                  <a:rPr lang="fr-FR" dirty="0"/>
+                  <a:t> </a:t>
+                </a:r>
+                <a:r>
+                  <a:rPr lang="fr-FR" dirty="0" smtClean="0"/>
+                  <a:t>the ratio : </a:t>
+                </a:r>
+                <a14:m>
+                  <m:oMath xmlns:m="http://schemas.openxmlformats.org/officeDocument/2006/math">
+                    <m:r>
+                      <m:rPr>
+                        <m:sty m:val="p"/>
+                      </m:rPr>
+                      <a:rPr lang="fr-FR" b="0" i="0" smtClean="0">
+                        <a:latin typeface="Cambria Math" panose="02040503050406030204" pitchFamily="18" charset="0"/>
+                      </a:rPr>
+                      <m:t>n</m:t>
+                    </m:r>
+                    <m:r>
+                      <a:rPr lang="fr-FR" b="0" i="0" smtClean="0">
+                        <a:latin typeface="Cambria Math" panose="02040503050406030204" pitchFamily="18" charset="0"/>
+                      </a:rPr>
+                      <m:t>=</m:t>
+                    </m:r>
+                    <m:f>
+                      <m:fPr>
+                        <m:ctrlPr>
+                          <a:rPr lang="fr-FR" i="1">
+                            <a:latin typeface="Cambria Math" panose="02040503050406030204" pitchFamily="18" charset="0"/>
+                          </a:rPr>
+                        </m:ctrlPr>
+                      </m:fPr>
+                      <m:num>
+                        <m:r>
+                          <a:rPr lang="fr-FR" b="0" i="1" smtClean="0">
+                            <a:latin typeface="Cambria Math" panose="02040503050406030204" pitchFamily="18" charset="0"/>
+                          </a:rPr>
+                          <m:t>𝑉𝑜𝑙𝑢𝑚𝑒</m:t>
+                        </m:r>
+                        <m:r>
+                          <a:rPr lang="fr-FR" i="1">
+                            <a:latin typeface="Cambria Math" panose="02040503050406030204" pitchFamily="18" charset="0"/>
+                          </a:rPr>
+                          <m:t>_</m:t>
+                        </m:r>
+                        <m:r>
+                          <a:rPr lang="fr-FR" b="0" i="1" smtClean="0">
+                            <a:latin typeface="Cambria Math" panose="02040503050406030204" pitchFamily="18" charset="0"/>
+                          </a:rPr>
+                          <m:t>𝑒𝑚𝑝𝑡𝑦</m:t>
+                        </m:r>
+                      </m:num>
+                      <m:den>
+                        <m:r>
+                          <a:rPr lang="fr-FR" b="0" i="1" smtClean="0">
+                            <a:latin typeface="Cambria Math" panose="02040503050406030204" pitchFamily="18" charset="0"/>
+                          </a:rPr>
+                          <m:t>𝑉𝑜𝑙𝑢𝑚𝑒</m:t>
+                        </m:r>
+                        <m:r>
+                          <a:rPr lang="fr-FR" i="1">
+                            <a:latin typeface="Cambria Math" panose="02040503050406030204" pitchFamily="18" charset="0"/>
+                          </a:rPr>
+                          <m:t>_</m:t>
+                        </m:r>
+                        <m:r>
+                          <a:rPr lang="fr-FR" i="1">
+                            <a:latin typeface="Cambria Math" panose="02040503050406030204" pitchFamily="18" charset="0"/>
+                          </a:rPr>
+                          <m:t>𝑇𝑂𝑇</m:t>
+                        </m:r>
+                      </m:den>
+                    </m:f>
+                  </m:oMath>
+                </a14:m>
+                <a:r>
+                  <a:rPr lang="fr-FR" dirty="0" smtClean="0"/>
+                  <a:t>=</a:t>
+                </a:r>
+                <a14:m>
+                  <m:oMath xmlns:m="http://schemas.openxmlformats.org/officeDocument/2006/math">
+                    <m:f>
+                      <m:fPr>
+                        <m:ctrlPr>
+                          <a:rPr lang="fr-FR" i="1">
+                            <a:latin typeface="Cambria Math" panose="02040503050406030204" pitchFamily="18" charset="0"/>
+                          </a:rPr>
+                        </m:ctrlPr>
+                      </m:fPr>
+                      <m:num>
+                        <m:r>
+                          <a:rPr lang="fr-FR" i="1">
+                            <a:latin typeface="Cambria Math" panose="02040503050406030204" pitchFamily="18" charset="0"/>
+                          </a:rPr>
+                          <m:t>𝑉𝑜𝑙𝑢𝑚𝑒</m:t>
+                        </m:r>
+                        <m:r>
+                          <a:rPr lang="fr-FR" i="1">
+                            <a:latin typeface="Cambria Math" panose="02040503050406030204" pitchFamily="18" charset="0"/>
+                          </a:rPr>
+                          <m:t>_</m:t>
+                        </m:r>
+                        <m:r>
+                          <a:rPr lang="fr-FR" i="1">
+                            <a:latin typeface="Cambria Math" panose="02040503050406030204" pitchFamily="18" charset="0"/>
+                          </a:rPr>
+                          <m:t>𝑒𝑚𝑝𝑡𝑦</m:t>
+                        </m:r>
+                      </m:num>
+                      <m:den>
+                        <m:r>
+                          <a:rPr lang="fr-FR" b="0" i="1" smtClean="0">
+                            <a:latin typeface="Cambria Math" panose="02040503050406030204" pitchFamily="18" charset="0"/>
+                          </a:rPr>
+                          <m:t>𝐸𝑆</m:t>
+                        </m:r>
+                        <m:r>
+                          <a:rPr lang="fr-FR" b="0" i="1" smtClean="0">
+                            <a:latin typeface="Cambria Math" panose="02040503050406030204" pitchFamily="18" charset="0"/>
+                          </a:rPr>
+                          <m:t>∗</m:t>
+                        </m:r>
+                        <m:r>
+                          <a:rPr lang="fr-FR" b="0" i="1" smtClean="0">
+                            <a:latin typeface="Cambria Math" panose="02040503050406030204" pitchFamily="18" charset="0"/>
+                          </a:rPr>
+                          <m:t>𝑠𝑢𝑟𝑓𝑎𝑐</m:t>
+                        </m:r>
+                      </m:den>
+                    </m:f>
+                  </m:oMath>
+                </a14:m>
+                <a:endParaRPr lang="fr-FR" dirty="0" smtClean="0"/>
+              </a:p>
+              <a:p>
+                <a:r>
+                  <a:rPr lang="fr-FR" dirty="0" smtClean="0"/>
+                  <a:t>Formula for </a:t>
+                </a:r>
+                <a:r>
+                  <a:rPr lang="fr-FR" dirty="0" err="1" smtClean="0"/>
+                  <a:t>sand</a:t>
+                </a:r>
+                <a:r>
+                  <a:rPr lang="fr-FR" dirty="0" smtClean="0"/>
+                  <a:t> mass </a:t>
+                </a:r>
+                <a:r>
+                  <a:rPr lang="fr-FR" b="1" dirty="0" smtClean="0"/>
+                  <a:t>MASS_SAND</a:t>
+                </a:r>
+                <a:r>
+                  <a:rPr lang="fr-FR" dirty="0" smtClean="0"/>
+                  <a:t> :</a:t>
+                </a:r>
+              </a:p>
+              <a:p>
+                <a:pPr marL="0" lvl="1" indent="0">
+                  <a:buNone/>
+                </a:pPr>
+                <a:r>
+                  <a:rPr lang="fr-FR" dirty="0" smtClean="0"/>
+                  <a:t>            </a:t>
+                </a:r>
+                <a14:m>
+                  <m:oMath xmlns:m="http://schemas.openxmlformats.org/officeDocument/2006/math">
+                    <m:sSub>
+                      <m:sSubPr>
+                        <m:ctrlPr>
+                          <a:rPr lang="fr-FR" i="1">
+                            <a:latin typeface="Cambria Math" panose="02040503050406030204" pitchFamily="18" charset="0"/>
+                          </a:rPr>
+                        </m:ctrlPr>
+                      </m:sSubPr>
+                      <m:e>
+                        <m:r>
+                          <a:rPr lang="fr-FR" b="0" i="1" smtClean="0">
+                            <a:latin typeface="Cambria Math" panose="02040503050406030204" pitchFamily="18" charset="0"/>
+                          </a:rPr>
+                          <m:t>𝑀</m:t>
+                        </m:r>
+                      </m:e>
+                      <m:sub>
+                        <m:r>
+                          <a:rPr lang="fr-FR" b="0" i="1" smtClean="0">
+                            <a:latin typeface="Cambria Math" panose="02040503050406030204" pitchFamily="18" charset="0"/>
+                          </a:rPr>
+                          <m:t>𝑠𝑎𝑛𝑑</m:t>
+                        </m:r>
+                      </m:sub>
+                    </m:sSub>
+                    <m:r>
+                      <a:rPr lang="fr-FR" i="1">
+                        <a:latin typeface="Cambria Math" panose="02040503050406030204" pitchFamily="18" charset="0"/>
+                      </a:rPr>
+                      <m:t>=</m:t>
+                    </m:r>
+                    <m:r>
+                      <a:rPr lang="fr-FR" i="1">
+                        <a:latin typeface="Cambria Math" panose="02040503050406030204" pitchFamily="18" charset="0"/>
+                      </a:rPr>
+                      <m:t>𝐸𝑆</m:t>
+                    </m:r>
+                    <m:r>
+                      <a:rPr lang="fr-FR" b="0" i="1" smtClean="0">
+                        <a:latin typeface="Cambria Math" panose="02040503050406030204" pitchFamily="18" charset="0"/>
+                      </a:rPr>
+                      <m:t>∗</m:t>
+                    </m:r>
+                    <m:r>
+                      <a:rPr lang="fr-FR" b="0" i="1" smtClean="0">
+                        <a:latin typeface="Cambria Math" panose="02040503050406030204" pitchFamily="18" charset="0"/>
+                      </a:rPr>
+                      <m:t>𝑠𝑢𝑟𝑓𝑎𝑐</m:t>
+                    </m:r>
+                    <m:r>
+                      <a:rPr lang="fr-FR" i="1">
+                        <a:latin typeface="Cambria Math" panose="02040503050406030204" pitchFamily="18" charset="0"/>
+                      </a:rPr>
+                      <m:t>∗</m:t>
+                    </m:r>
+                    <m:r>
+                      <a:rPr lang="fr-FR" b="0" i="1" smtClean="0">
+                        <a:latin typeface="Cambria Math" panose="02040503050406030204" pitchFamily="18" charset="0"/>
+                      </a:rPr>
+                      <m:t>(1−</m:t>
+                    </m:r>
+                    <m:sSub>
+                      <m:sSubPr>
+                        <m:ctrlPr>
+                          <a:rPr lang="fr-FR" i="1">
+                            <a:latin typeface="Cambria Math" panose="02040503050406030204" pitchFamily="18" charset="0"/>
+                          </a:rPr>
+                        </m:ctrlPr>
+                      </m:sSubPr>
+                      <m:e>
+                        <m:r>
+                          <a:rPr lang="fr-FR" i="1">
+                            <a:latin typeface="Cambria Math" panose="02040503050406030204" pitchFamily="18" charset="0"/>
+                          </a:rPr>
+                          <m:t>𝑅</m:t>
+                        </m:r>
+                      </m:e>
+                      <m:sub>
+                        <m:r>
+                          <a:rPr lang="fr-FR" b="0" i="1" smtClean="0">
+                            <a:latin typeface="Cambria Math" panose="02040503050406030204" pitchFamily="18" charset="0"/>
+                          </a:rPr>
+                          <m:t>𝑀</m:t>
+                        </m:r>
+                      </m:sub>
+                    </m:sSub>
+                    <m:r>
+                      <a:rPr lang="fr-FR" b="0" i="1" smtClean="0">
+                        <a:latin typeface="Cambria Math" panose="02040503050406030204" pitchFamily="18" charset="0"/>
+                      </a:rPr>
+                      <m:t>)</m:t>
+                    </m:r>
+                    <m:r>
+                      <a:rPr lang="fr-FR" i="1">
+                        <a:latin typeface="Cambria Math" panose="02040503050406030204" pitchFamily="18" charset="0"/>
+                      </a:rPr>
+                      <m:t>∗</m:t>
+                    </m:r>
+                    <m:sSub>
+                      <m:sSubPr>
+                        <m:ctrlPr>
+                          <a:rPr lang="fr-FR" i="1">
+                            <a:latin typeface="Cambria Math" panose="02040503050406030204" pitchFamily="18" charset="0"/>
+                            <a:ea typeface="Cambria Math" panose="02040503050406030204" pitchFamily="18" charset="0"/>
+                          </a:rPr>
+                        </m:ctrlPr>
+                      </m:sSubPr>
+                      <m:e>
+                        <m:r>
+                          <a:rPr lang="fr-FR" i="1">
+                            <a:latin typeface="Cambria Math" panose="02040503050406030204" pitchFamily="18" charset="0"/>
+                            <a:ea typeface="Cambria Math" panose="02040503050406030204" pitchFamily="18" charset="0"/>
+                          </a:rPr>
+                          <m:t>𝜌</m:t>
+                        </m:r>
+                      </m:e>
+                      <m:sub>
+                        <m:r>
+                          <a:rPr lang="fr-FR" i="1">
+                            <a:latin typeface="Cambria Math" panose="02040503050406030204" pitchFamily="18" charset="0"/>
+                            <a:ea typeface="Cambria Math" panose="02040503050406030204" pitchFamily="18" charset="0"/>
+                          </a:rPr>
+                          <m:t>𝑆𝐴𝑁𝐷</m:t>
+                        </m:r>
+                      </m:sub>
+                    </m:sSub>
+                  </m:oMath>
+                </a14:m>
+                <a:endParaRPr lang="fr-FR" dirty="0" smtClean="0"/>
+              </a:p>
+              <a:p>
+                <a:r>
+                  <a:rPr lang="fr-FR" dirty="0" smtClean="0"/>
+                  <a:t>Formula for </a:t>
+                </a:r>
+                <a:r>
+                  <a:rPr lang="fr-FR" dirty="0" err="1" smtClean="0"/>
+                  <a:t>mud</a:t>
+                </a:r>
+                <a:r>
+                  <a:rPr lang="fr-FR" dirty="0" smtClean="0"/>
+                  <a:t> mass </a:t>
+                </a:r>
+                <a:r>
+                  <a:rPr lang="fr-FR" b="1" dirty="0" smtClean="0"/>
+                  <a:t>MASS_MUD</a:t>
+                </a:r>
+                <a:r>
+                  <a:rPr lang="fr-FR" dirty="0" smtClean="0"/>
+                  <a:t> :</a:t>
+                </a:r>
+              </a:p>
+              <a:p>
+                <a:pPr marL="400050" lvl="1" indent="0">
+                  <a:buNone/>
+                </a:pPr>
+                <a14:m>
+                  <m:oMath xmlns:m="http://schemas.openxmlformats.org/officeDocument/2006/math">
+                    <m:sSub>
+                      <m:sSubPr>
+                        <m:ctrlPr>
+                          <a:rPr lang="fr-FR" i="1">
+                            <a:latin typeface="Cambria Math" panose="02040503050406030204" pitchFamily="18" charset="0"/>
+                          </a:rPr>
+                        </m:ctrlPr>
+                      </m:sSubPr>
+                      <m:e>
+                        <m:r>
+                          <a:rPr lang="fr-FR" i="1">
+                            <a:latin typeface="Cambria Math" panose="02040503050406030204" pitchFamily="18" charset="0"/>
+                          </a:rPr>
+                          <m:t>𝑀</m:t>
+                        </m:r>
+                      </m:e>
+                      <m:sub>
+                        <m:r>
+                          <a:rPr lang="fr-FR" i="1">
+                            <a:latin typeface="Cambria Math" panose="02040503050406030204" pitchFamily="18" charset="0"/>
+                          </a:rPr>
+                          <m:t>𝑚𝑢𝑑</m:t>
+                        </m:r>
+                      </m:sub>
+                    </m:sSub>
+                    <m:r>
+                      <a:rPr lang="fr-FR" i="1">
+                        <a:latin typeface="Cambria Math" panose="02040503050406030204" pitchFamily="18" charset="0"/>
+                      </a:rPr>
+                      <m:t>=</m:t>
+                    </m:r>
+                    <m:r>
+                      <a:rPr lang="fr-FR" i="1">
+                        <a:latin typeface="Cambria Math" panose="02040503050406030204" pitchFamily="18" charset="0"/>
+                      </a:rPr>
+                      <m:t>𝐸𝑆</m:t>
+                    </m:r>
+                    <m:r>
+                      <a:rPr lang="fr-FR" b="0" i="1" smtClean="0">
+                        <a:latin typeface="Cambria Math" panose="02040503050406030204" pitchFamily="18" charset="0"/>
+                      </a:rPr>
+                      <m:t>∗</m:t>
+                    </m:r>
+                    <m:r>
+                      <a:rPr lang="fr-FR" b="0" i="1" smtClean="0">
+                        <a:latin typeface="Cambria Math" panose="02040503050406030204" pitchFamily="18" charset="0"/>
+                      </a:rPr>
+                      <m:t>𝑠𝑢𝑟𝑓𝑎𝑐</m:t>
+                    </m:r>
+                    <m:r>
+                      <a:rPr lang="fr-FR" i="1">
+                        <a:latin typeface="Cambria Math" panose="02040503050406030204" pitchFamily="18" charset="0"/>
+                      </a:rPr>
+                      <m:t>∗</m:t>
+                    </m:r>
+                    <m:sSub>
+                      <m:sSubPr>
+                        <m:ctrlPr>
+                          <a:rPr lang="fr-FR" i="1">
+                            <a:latin typeface="Cambria Math" panose="02040503050406030204" pitchFamily="18" charset="0"/>
+                          </a:rPr>
+                        </m:ctrlPr>
+                      </m:sSubPr>
+                      <m:e>
+                        <m:r>
+                          <a:rPr lang="fr-FR" i="1">
+                            <a:latin typeface="Cambria Math" panose="02040503050406030204" pitchFamily="18" charset="0"/>
+                          </a:rPr>
+                          <m:t>𝑅</m:t>
+                        </m:r>
+                      </m:e>
+                      <m:sub>
+                        <m:r>
+                          <a:rPr lang="fr-FR" i="1">
+                            <a:latin typeface="Cambria Math" panose="02040503050406030204" pitchFamily="18" charset="0"/>
+                          </a:rPr>
+                          <m:t>𝑀</m:t>
+                        </m:r>
+                      </m:sub>
+                    </m:sSub>
+                    <m:r>
+                      <a:rPr lang="fr-FR" i="1">
+                        <a:latin typeface="Cambria Math" panose="02040503050406030204" pitchFamily="18" charset="0"/>
+                      </a:rPr>
+                      <m:t>∗</m:t>
+                    </m:r>
+                  </m:oMath>
+                </a14:m>
+                <a:r>
+                  <a:rPr lang="fr-FR" dirty="0">
+                    <a:ea typeface="Cambria Math" panose="02040503050406030204" pitchFamily="18" charset="0"/>
+                  </a:rPr>
+                  <a:t> </a:t>
+                </a:r>
+                <a14:m>
+                  <m:oMath xmlns:m="http://schemas.openxmlformats.org/officeDocument/2006/math">
+                    <m:sSub>
+                      <m:sSubPr>
+                        <m:ctrlPr>
+                          <a:rPr lang="fr-FR" i="1">
+                            <a:latin typeface="Cambria Math" panose="02040503050406030204" pitchFamily="18" charset="0"/>
+                            <a:ea typeface="Cambria Math" panose="02040503050406030204" pitchFamily="18" charset="0"/>
+                          </a:rPr>
+                        </m:ctrlPr>
+                      </m:sSubPr>
+                      <m:e>
+                        <m:r>
+                          <a:rPr lang="fr-FR" i="1">
+                            <a:latin typeface="Cambria Math" panose="02040503050406030204" pitchFamily="18" charset="0"/>
+                            <a:ea typeface="Cambria Math" panose="02040503050406030204" pitchFamily="18" charset="0"/>
+                          </a:rPr>
+                          <m:t>𝜌</m:t>
+                        </m:r>
+                      </m:e>
+                      <m:sub>
+                        <m:r>
+                          <a:rPr lang="fr-FR" i="1">
+                            <a:latin typeface="Cambria Math" panose="02040503050406030204" pitchFamily="18" charset="0"/>
+                            <a:ea typeface="Cambria Math" panose="02040503050406030204" pitchFamily="18" charset="0"/>
+                          </a:rPr>
+                          <m:t>𝑀𝑈𝐷</m:t>
+                        </m:r>
+                      </m:sub>
+                    </m:sSub>
+                  </m:oMath>
+                </a14:m>
+                <a:endParaRPr lang="fr-FR" dirty="0" smtClean="0"/>
+              </a:p>
+              <a:p>
+                <a:r>
+                  <a:rPr lang="fr-FR" dirty="0" smtClean="0"/>
+                  <a:t>Formula for total mass </a:t>
+                </a:r>
+                <a:r>
+                  <a:rPr lang="fr-FR" b="1" dirty="0" smtClean="0"/>
+                  <a:t>MASS_TOT</a:t>
+                </a:r>
+                <a:r>
+                  <a:rPr lang="fr-FR" dirty="0" smtClean="0"/>
+                  <a:t> : </a:t>
+                </a:r>
+              </a:p>
+              <a:p>
+                <a:pPr marL="457200" lvl="1" indent="0">
+                  <a:buNone/>
+                </a:pPr>
+                <a14:m>
+                  <m:oMath xmlns:m="http://schemas.openxmlformats.org/officeDocument/2006/math">
+                    <m:sSub>
+                      <m:sSubPr>
+                        <m:ctrlPr>
+                          <a:rPr lang="fr-FR" b="0" i="1" smtClean="0">
+                            <a:latin typeface="Cambria Math" panose="02040503050406030204" pitchFamily="18" charset="0"/>
+                          </a:rPr>
+                        </m:ctrlPr>
+                      </m:sSubPr>
+                      <m:e>
+                        <m:r>
+                          <a:rPr lang="fr-FR" b="0" i="1" smtClean="0">
+                            <a:latin typeface="Cambria Math" panose="02040503050406030204" pitchFamily="18" charset="0"/>
+                          </a:rPr>
+                          <m:t>𝑀</m:t>
+                        </m:r>
+                      </m:e>
+                      <m:sub>
+                        <m:r>
+                          <a:rPr lang="fr-FR" b="0" i="1" smtClean="0">
+                            <a:latin typeface="Cambria Math" panose="02040503050406030204" pitchFamily="18" charset="0"/>
+                          </a:rPr>
+                          <m:t>𝑇𝑂𝑇</m:t>
+                        </m:r>
+                      </m:sub>
+                    </m:sSub>
+                    <m:r>
+                      <a:rPr lang="fr-FR" b="0" i="1" smtClean="0">
+                        <a:latin typeface="Cambria Math" panose="02040503050406030204" pitchFamily="18" charset="0"/>
+                      </a:rPr>
+                      <m:t>=</m:t>
+                    </m:r>
+                    <m:r>
+                      <a:rPr lang="fr-FR" b="0" i="1" smtClean="0">
+                        <a:latin typeface="Cambria Math" panose="02040503050406030204" pitchFamily="18" charset="0"/>
+                      </a:rPr>
+                      <m:t>𝐸𝑆</m:t>
+                    </m:r>
+                    <m:r>
+                      <a:rPr lang="fr-FR" b="0" i="1" smtClean="0">
+                        <a:latin typeface="Cambria Math" panose="02040503050406030204" pitchFamily="18" charset="0"/>
+                      </a:rPr>
+                      <m:t>∗</m:t>
+                    </m:r>
+                    <m:r>
+                      <a:rPr lang="fr-FR" b="0" i="1" smtClean="0">
+                        <a:latin typeface="Cambria Math" panose="02040503050406030204" pitchFamily="18" charset="0"/>
+                      </a:rPr>
+                      <m:t>𝑠𝑢𝑟𝑓𝑎𝑐</m:t>
+                    </m:r>
+                    <m:r>
+                      <a:rPr lang="fr-FR" b="0" i="1" smtClean="0">
+                        <a:latin typeface="Cambria Math" panose="02040503050406030204" pitchFamily="18" charset="0"/>
+                      </a:rPr>
+                      <m:t>∗</m:t>
+                    </m:r>
+                    <m:sSub>
+                      <m:sSubPr>
+                        <m:ctrlPr>
+                          <a:rPr lang="fr-FR" b="0" i="1" smtClean="0">
+                            <a:latin typeface="Cambria Math" panose="02040503050406030204" pitchFamily="18" charset="0"/>
+                          </a:rPr>
+                        </m:ctrlPr>
+                      </m:sSubPr>
+                      <m:e>
+                        <m:r>
+                          <a:rPr lang="fr-FR" b="0" i="1" smtClean="0">
+                            <a:latin typeface="Cambria Math" panose="02040503050406030204" pitchFamily="18" charset="0"/>
+                          </a:rPr>
+                          <m:t>(</m:t>
+                        </m:r>
+                        <m:r>
+                          <a:rPr lang="fr-FR" b="0" i="1" smtClean="0">
+                            <a:latin typeface="Cambria Math" panose="02040503050406030204" pitchFamily="18" charset="0"/>
+                          </a:rPr>
+                          <m:t>𝑅</m:t>
+                        </m:r>
+                      </m:e>
+                      <m:sub>
+                        <m:r>
+                          <a:rPr lang="fr-FR" b="0" i="1" smtClean="0">
+                            <a:latin typeface="Cambria Math" panose="02040503050406030204" pitchFamily="18" charset="0"/>
+                          </a:rPr>
+                          <m:t>𝑀</m:t>
+                        </m:r>
+                      </m:sub>
+                    </m:sSub>
+                    <m:r>
+                      <a:rPr lang="fr-FR" b="0" i="1" smtClean="0">
+                        <a:latin typeface="Cambria Math" panose="02040503050406030204" pitchFamily="18" charset="0"/>
+                      </a:rPr>
+                      <m:t>∗</m:t>
+                    </m:r>
+                  </m:oMath>
+                </a14:m>
+                <a:r>
+                  <a:rPr lang="fr-FR" dirty="0">
+                    <a:ea typeface="Cambria Math" panose="02040503050406030204" pitchFamily="18" charset="0"/>
+                  </a:rPr>
+                  <a:t> </a:t>
+                </a:r>
+                <a14:m>
+                  <m:oMath xmlns:m="http://schemas.openxmlformats.org/officeDocument/2006/math">
+                    <m:sSub>
+                      <m:sSubPr>
+                        <m:ctrlPr>
+                          <a:rPr lang="fr-FR" i="1">
+                            <a:latin typeface="Cambria Math" panose="02040503050406030204" pitchFamily="18" charset="0"/>
+                            <a:ea typeface="Cambria Math" panose="02040503050406030204" pitchFamily="18" charset="0"/>
+                          </a:rPr>
+                        </m:ctrlPr>
+                      </m:sSubPr>
+                      <m:e>
+                        <m:r>
+                          <a:rPr lang="fr-FR" i="1">
+                            <a:latin typeface="Cambria Math" panose="02040503050406030204" pitchFamily="18" charset="0"/>
+                            <a:ea typeface="Cambria Math" panose="02040503050406030204" pitchFamily="18" charset="0"/>
+                          </a:rPr>
+                          <m:t>𝜌</m:t>
+                        </m:r>
+                      </m:e>
+                      <m:sub>
+                        <m:r>
+                          <a:rPr lang="fr-FR" i="1">
+                            <a:latin typeface="Cambria Math" panose="02040503050406030204" pitchFamily="18" charset="0"/>
+                            <a:ea typeface="Cambria Math" panose="02040503050406030204" pitchFamily="18" charset="0"/>
+                          </a:rPr>
+                          <m:t>𝑀𝑈𝐷</m:t>
+                        </m:r>
+                      </m:sub>
+                    </m:sSub>
+                    <m:r>
+                      <a:rPr lang="fr-FR" b="0" i="1" smtClean="0">
+                        <a:latin typeface="Cambria Math" panose="02040503050406030204" pitchFamily="18" charset="0"/>
+                        <a:ea typeface="Cambria Math" panose="02040503050406030204" pitchFamily="18" charset="0"/>
+                      </a:rPr>
+                      <m:t>+</m:t>
+                    </m:r>
+                    <m:r>
+                      <a:rPr lang="fr-FR" i="1">
+                        <a:latin typeface="Cambria Math" panose="02040503050406030204" pitchFamily="18" charset="0"/>
+                      </a:rPr>
+                      <m:t>(1−</m:t>
+                    </m:r>
+                    <m:sSub>
+                      <m:sSubPr>
+                        <m:ctrlPr>
+                          <a:rPr lang="fr-FR" i="1">
+                            <a:latin typeface="Cambria Math" panose="02040503050406030204" pitchFamily="18" charset="0"/>
+                          </a:rPr>
+                        </m:ctrlPr>
+                      </m:sSubPr>
+                      <m:e>
+                        <m:r>
+                          <a:rPr lang="fr-FR" i="1">
+                            <a:latin typeface="Cambria Math" panose="02040503050406030204" pitchFamily="18" charset="0"/>
+                          </a:rPr>
+                          <m:t>𝑅</m:t>
+                        </m:r>
+                      </m:e>
+                      <m:sub>
+                        <m:r>
+                          <a:rPr lang="fr-FR" i="1">
+                            <a:latin typeface="Cambria Math" panose="02040503050406030204" pitchFamily="18" charset="0"/>
+                          </a:rPr>
+                          <m:t>𝑀</m:t>
+                        </m:r>
+                      </m:sub>
+                    </m:sSub>
+                    <m:r>
+                      <a:rPr lang="fr-FR" i="1">
+                        <a:latin typeface="Cambria Math" panose="02040503050406030204" pitchFamily="18" charset="0"/>
+                      </a:rPr>
+                      <m:t>)∗</m:t>
+                    </m:r>
+                    <m:sSub>
+                      <m:sSubPr>
+                        <m:ctrlPr>
+                          <a:rPr lang="fr-FR" i="1">
+                            <a:latin typeface="Cambria Math" panose="02040503050406030204" pitchFamily="18" charset="0"/>
+                            <a:ea typeface="Cambria Math" panose="02040503050406030204" pitchFamily="18" charset="0"/>
+                          </a:rPr>
+                        </m:ctrlPr>
+                      </m:sSubPr>
+                      <m:e>
+                        <m:r>
+                          <a:rPr lang="fr-FR" i="1">
+                            <a:latin typeface="Cambria Math" panose="02040503050406030204" pitchFamily="18" charset="0"/>
+                            <a:ea typeface="Cambria Math" panose="02040503050406030204" pitchFamily="18" charset="0"/>
+                          </a:rPr>
+                          <m:t>𝜌</m:t>
+                        </m:r>
+                      </m:e>
+                      <m:sub>
+                        <m:r>
+                          <a:rPr lang="fr-FR" i="1">
+                            <a:latin typeface="Cambria Math" panose="02040503050406030204" pitchFamily="18" charset="0"/>
+                            <a:ea typeface="Cambria Math" panose="02040503050406030204" pitchFamily="18" charset="0"/>
+                          </a:rPr>
+                          <m:t>𝑆𝐴𝑁𝐷</m:t>
+                        </m:r>
+                      </m:sub>
+                    </m:sSub>
+                  </m:oMath>
+                </a14:m>
+                <a:r>
+                  <a:rPr lang="fr-FR" dirty="0" smtClean="0">
+                    <a:ea typeface="Cambria Math" panose="02040503050406030204" pitchFamily="18" charset="0"/>
+                  </a:rPr>
+                  <a:t>)</a:t>
+                </a:r>
+              </a:p>
+              <a:p>
+                <a:pPr marL="57150" indent="0">
+                  <a:buNone/>
+                </a:pPr>
+                <a:r>
+                  <a:rPr lang="fr-FR" dirty="0" smtClean="0">
+                    <a:ea typeface="Cambria Math" panose="02040503050406030204" pitchFamily="18" charset="0"/>
+                  </a:rPr>
+                  <a:t> </a:t>
+                </a:r>
+              </a:p>
+              <a:p>
+                <a:pPr marL="457200" lvl="1" indent="0">
+                  <a:buNone/>
+                </a:pPr>
+                <a:endParaRPr lang="fr-FR" dirty="0" smtClean="0"/>
+              </a:p>
+            </p:txBody>
+          </p:sp>
+        </mc:Choice>
+        <mc:Fallback xmlns="">
+          <p:sp>
+            <p:nvSpPr>
+              <p:cNvPr id="7" name="Espace réservé du contenu 2"/>
+              <p:cNvSpPr txBox="1">
+                <a:spLocks noRot="1" noChangeAspect="1" noMove="1" noResize="1" noEditPoints="1" noAdjustHandles="1" noChangeArrowheads="1" noChangeShapeType="1" noTextEdit="1"/>
+              </p:cNvSpPr>
+              <p:nvPr/>
+            </p:nvSpPr>
+            <p:spPr>
+              <a:xfrm>
+                <a:off x="381280" y="3068960"/>
+                <a:ext cx="8229600" cy="3672408"/>
+              </a:xfrm>
+              <a:prstGeom prst="rect">
+                <a:avLst/>
+              </a:prstGeom>
+              <a:blipFill rotWithShape="0">
+                <a:blip r:embed="rId3"/>
+                <a:stretch>
+                  <a:fillRect l="-667" t="-2156"/>
+                </a:stretch>
+              </a:blipFill>
+            </p:spPr>
+            <p:txBody>
+              <a:bodyPr/>
+              <a:lstStyle/>
+              <a:p>
+                <a:r>
+                  <a:rPr lang="fr-FR">
+                    <a:noFill/>
+                  </a:rPr>
+                  <a:t> </a:t>
+                </a:r>
+              </a:p>
+            </p:txBody>
+          </p:sp>
+        </mc:Fallback>
+      </mc:AlternateContent>
+    </p:spTree>
+    <p:extLst>
+      <p:ext uri="{BB962C8B-B14F-4D97-AF65-F5344CB8AC3E}">
+        <p14:creationId xmlns:p14="http://schemas.microsoft.com/office/powerpoint/2010/main" val="1785874031"/>
       </p:ext>
     </p:extLst>
   </p:cSld>

</xml_diff>

<commit_message>
CONC_VASE replaced now by CONC_MUD
</commit_message>
<xml_diff>
--- a/documentation/sisyphe/convergence_sed.pptx
+++ b/documentation/sisyphe/convergence_sed.pptx
@@ -316,7 +316,7 @@
           <a:p>
             <a:fld id="{AA309A6D-C09C-4548-B29A-6CF363A7E532}" type="datetimeFigureOut">
               <a:rPr lang="fr-FR" smtClean="0"/>
-              <a:t>22/11/2017</a:t>
+              <a:t>24/11/2017</a:t>
             </a:fld>
             <a:endParaRPr lang="fr-BE"/>
           </a:p>
@@ -481,7 +481,7 @@
           <a:p>
             <a:fld id="{AA309A6D-C09C-4548-B29A-6CF363A7E532}" type="datetimeFigureOut">
               <a:rPr lang="fr-FR" smtClean="0"/>
-              <a:t>22/11/2017</a:t>
+              <a:t>24/11/2017</a:t>
             </a:fld>
             <a:endParaRPr lang="fr-BE"/>
           </a:p>
@@ -656,7 +656,7 @@
           <a:p>
             <a:fld id="{AA309A6D-C09C-4548-B29A-6CF363A7E532}" type="datetimeFigureOut">
               <a:rPr lang="fr-FR" smtClean="0"/>
-              <a:t>22/11/2017</a:t>
+              <a:t>24/11/2017</a:t>
             </a:fld>
             <a:endParaRPr lang="fr-BE"/>
           </a:p>
@@ -821,7 +821,7 @@
           <a:p>
             <a:fld id="{AA309A6D-C09C-4548-B29A-6CF363A7E532}" type="datetimeFigureOut">
               <a:rPr lang="fr-FR" smtClean="0"/>
-              <a:t>22/11/2017</a:t>
+              <a:t>24/11/2017</a:t>
             </a:fld>
             <a:endParaRPr lang="fr-BE"/>
           </a:p>
@@ -1062,7 +1062,7 @@
           <a:p>
             <a:fld id="{AA309A6D-C09C-4548-B29A-6CF363A7E532}" type="datetimeFigureOut">
               <a:rPr lang="fr-FR" smtClean="0"/>
-              <a:t>22/11/2017</a:t>
+              <a:t>24/11/2017</a:t>
             </a:fld>
             <a:endParaRPr lang="fr-BE"/>
           </a:p>
@@ -1345,7 +1345,7 @@
           <a:p>
             <a:fld id="{AA309A6D-C09C-4548-B29A-6CF363A7E532}" type="datetimeFigureOut">
               <a:rPr lang="fr-FR" smtClean="0"/>
-              <a:t>22/11/2017</a:t>
+              <a:t>24/11/2017</a:t>
             </a:fld>
             <a:endParaRPr lang="fr-BE"/>
           </a:p>
@@ -1762,7 +1762,7 @@
           <a:p>
             <a:fld id="{AA309A6D-C09C-4548-B29A-6CF363A7E532}" type="datetimeFigureOut">
               <a:rPr lang="fr-FR" smtClean="0"/>
-              <a:t>22/11/2017</a:t>
+              <a:t>24/11/2017</a:t>
             </a:fld>
             <a:endParaRPr lang="fr-BE"/>
           </a:p>
@@ -1875,7 +1875,7 @@
           <a:p>
             <a:fld id="{AA309A6D-C09C-4548-B29A-6CF363A7E532}" type="datetimeFigureOut">
               <a:rPr lang="fr-FR" smtClean="0"/>
-              <a:t>22/11/2017</a:t>
+              <a:t>24/11/2017</a:t>
             </a:fld>
             <a:endParaRPr lang="fr-BE"/>
           </a:p>
@@ -1965,7 +1965,7 @@
           <a:p>
             <a:fld id="{AA309A6D-C09C-4548-B29A-6CF363A7E532}" type="datetimeFigureOut">
               <a:rPr lang="fr-FR" smtClean="0"/>
-              <a:t>22/11/2017</a:t>
+              <a:t>24/11/2017</a:t>
             </a:fld>
             <a:endParaRPr lang="fr-BE"/>
           </a:p>
@@ -2237,7 +2237,7 @@
           <a:p>
             <a:fld id="{AA309A6D-C09C-4548-B29A-6CF363A7E532}" type="datetimeFigureOut">
               <a:rPr lang="fr-FR" smtClean="0"/>
-              <a:t>22/11/2017</a:t>
+              <a:t>24/11/2017</a:t>
             </a:fld>
             <a:endParaRPr lang="fr-BE"/>
           </a:p>
@@ -2485,7 +2485,7 @@
           <a:p>
             <a:fld id="{AA309A6D-C09C-4548-B29A-6CF363A7E532}" type="datetimeFigureOut">
               <a:rPr lang="fr-FR" smtClean="0"/>
-              <a:t>22/11/2017</a:t>
+              <a:t>24/11/2017</a:t>
             </a:fld>
             <a:endParaRPr lang="fr-BE"/>
           </a:p>
@@ -2693,7 +2693,7 @@
           <a:p>
             <a:fld id="{AA309A6D-C09C-4548-B29A-6CF363A7E532}" type="datetimeFigureOut">
               <a:rPr lang="fr-FR" smtClean="0"/>
-              <a:t>22/11/2017</a:t>
+              <a:t>24/11/2017</a:t>
             </a:fld>
             <a:endParaRPr lang="fr-BE"/>
           </a:p>
@@ -5376,7 +5376,7 @@
                   </a:schemeClr>
                 </a:solidFill>
               </a:rPr>
-              <a:t>UPDATE_ACTIVE_LAYER_HIRANO.f</a:t>
+              <a:t>UPDATE_ACTIVELAYER_HIRANO.f</a:t>
             </a:r>
             <a:r>
               <a:rPr lang="fr-FR" sz="1200" dirty="0" smtClean="0">

</xml_diff>

<commit_message>
[ppt] ppt changed according to active layer hirano
</commit_message>
<xml_diff>
--- a/documentation/sisyphe/convergence_sed.pptx
+++ b/documentation/sisyphe/convergence_sed.pptx
@@ -316,7 +316,7 @@
           <a:p>
             <a:fld id="{AA309A6D-C09C-4548-B29A-6CF363A7E532}" type="datetimeFigureOut">
               <a:rPr lang="fr-FR" smtClean="0"/>
-              <a:t>24/11/2017</a:t>
+              <a:t>27/11/2017</a:t>
             </a:fld>
             <a:endParaRPr lang="fr-BE"/>
           </a:p>
@@ -481,7 +481,7 @@
           <a:p>
             <a:fld id="{AA309A6D-C09C-4548-B29A-6CF363A7E532}" type="datetimeFigureOut">
               <a:rPr lang="fr-FR" smtClean="0"/>
-              <a:t>24/11/2017</a:t>
+              <a:t>27/11/2017</a:t>
             </a:fld>
             <a:endParaRPr lang="fr-BE"/>
           </a:p>
@@ -656,7 +656,7 @@
           <a:p>
             <a:fld id="{AA309A6D-C09C-4548-B29A-6CF363A7E532}" type="datetimeFigureOut">
               <a:rPr lang="fr-FR" smtClean="0"/>
-              <a:t>24/11/2017</a:t>
+              <a:t>27/11/2017</a:t>
             </a:fld>
             <a:endParaRPr lang="fr-BE"/>
           </a:p>
@@ -821,7 +821,7 @@
           <a:p>
             <a:fld id="{AA309A6D-C09C-4548-B29A-6CF363A7E532}" type="datetimeFigureOut">
               <a:rPr lang="fr-FR" smtClean="0"/>
-              <a:t>24/11/2017</a:t>
+              <a:t>27/11/2017</a:t>
             </a:fld>
             <a:endParaRPr lang="fr-BE"/>
           </a:p>
@@ -1062,7 +1062,7 @@
           <a:p>
             <a:fld id="{AA309A6D-C09C-4548-B29A-6CF363A7E532}" type="datetimeFigureOut">
               <a:rPr lang="fr-FR" smtClean="0"/>
-              <a:t>24/11/2017</a:t>
+              <a:t>27/11/2017</a:t>
             </a:fld>
             <a:endParaRPr lang="fr-BE"/>
           </a:p>
@@ -1345,7 +1345,7 @@
           <a:p>
             <a:fld id="{AA309A6D-C09C-4548-B29A-6CF363A7E532}" type="datetimeFigureOut">
               <a:rPr lang="fr-FR" smtClean="0"/>
-              <a:t>24/11/2017</a:t>
+              <a:t>27/11/2017</a:t>
             </a:fld>
             <a:endParaRPr lang="fr-BE"/>
           </a:p>
@@ -1762,7 +1762,7 @@
           <a:p>
             <a:fld id="{AA309A6D-C09C-4548-B29A-6CF363A7E532}" type="datetimeFigureOut">
               <a:rPr lang="fr-FR" smtClean="0"/>
-              <a:t>24/11/2017</a:t>
+              <a:t>27/11/2017</a:t>
             </a:fld>
             <a:endParaRPr lang="fr-BE"/>
           </a:p>
@@ -1875,7 +1875,7 @@
           <a:p>
             <a:fld id="{AA309A6D-C09C-4548-B29A-6CF363A7E532}" type="datetimeFigureOut">
               <a:rPr lang="fr-FR" smtClean="0"/>
-              <a:t>24/11/2017</a:t>
+              <a:t>27/11/2017</a:t>
             </a:fld>
             <a:endParaRPr lang="fr-BE"/>
           </a:p>
@@ -1965,7 +1965,7 @@
           <a:p>
             <a:fld id="{AA309A6D-C09C-4548-B29A-6CF363A7E532}" type="datetimeFigureOut">
               <a:rPr lang="fr-FR" smtClean="0"/>
-              <a:t>24/11/2017</a:t>
+              <a:t>27/11/2017</a:t>
             </a:fld>
             <a:endParaRPr lang="fr-BE"/>
           </a:p>
@@ -2237,7 +2237,7 @@
           <a:p>
             <a:fld id="{AA309A6D-C09C-4548-B29A-6CF363A7E532}" type="datetimeFigureOut">
               <a:rPr lang="fr-FR" smtClean="0"/>
-              <a:t>24/11/2017</a:t>
+              <a:t>27/11/2017</a:t>
             </a:fld>
             <a:endParaRPr lang="fr-BE"/>
           </a:p>
@@ -2485,7 +2485,7 @@
           <a:p>
             <a:fld id="{AA309A6D-C09C-4548-B29A-6CF363A7E532}" type="datetimeFigureOut">
               <a:rPr lang="fr-FR" smtClean="0"/>
-              <a:t>24/11/2017</a:t>
+              <a:t>27/11/2017</a:t>
             </a:fld>
             <a:endParaRPr lang="fr-BE"/>
           </a:p>
@@ -2693,7 +2693,7 @@
           <a:p>
             <a:fld id="{AA309A6D-C09C-4548-B29A-6CF363A7E532}" type="datetimeFigureOut">
               <a:rPr lang="fr-FR" smtClean="0"/>
-              <a:t>24/11/2017</a:t>
+              <a:t>27/11/2017</a:t>
             </a:fld>
             <a:endParaRPr lang="fr-BE"/>
           </a:p>
@@ -5178,79 +5178,25 @@
                   </a:schemeClr>
                 </a:solidFill>
               </a:rPr>
-              <a:t>  If (CONSOLIDATION)THEN</a:t>
-            </a:r>
-          </a:p>
-          <a:p>
-            <a:r>
-              <a:rPr lang="fr-FR" sz="1200" dirty="0">
+              <a:t>  If (</a:t>
+            </a:r>
+            <a:r>
+              <a:rPr lang="fr-FR" sz="1200" dirty="0" smtClean="0">
                 <a:solidFill>
                   <a:schemeClr val="accent3">
                     <a:lumMod val="75000"/>
                   </a:schemeClr>
                 </a:solidFill>
               </a:rPr>
-              <a:t> </a:t>
+              <a:t>CONSOLIDATION)THEN </a:t>
             </a:r>
             <a:r>
               <a:rPr lang="fr-FR" sz="1200" dirty="0" smtClean="0">
                 <a:solidFill>
-                  <a:schemeClr val="accent3">
-                    <a:lumMod val="75000"/>
-                  </a:schemeClr>
-                </a:solidFill>
-              </a:rPr>
-              <a:t>   </a:t>
-            </a:r>
-            <a:r>
-              <a:rPr lang="fr-FR" sz="1200" dirty="0">
-                <a:solidFill>
-                  <a:schemeClr val="accent3">
-                    <a:lumMod val="75000"/>
-                  </a:schemeClr>
-                </a:solidFill>
-              </a:rPr>
-              <a:t>STOP ‘Not </a:t>
-            </a:r>
-            <a:r>
-              <a:rPr lang="fr-FR" sz="1200" dirty="0" err="1">
-                <a:solidFill>
-                  <a:schemeClr val="accent3">
-                    <a:lumMod val="75000"/>
-                  </a:schemeClr>
-                </a:solidFill>
-              </a:rPr>
-              <a:t>programmed</a:t>
-            </a:r>
-            <a:r>
-              <a:rPr lang="fr-FR" sz="1200" dirty="0">
-                <a:solidFill>
-                  <a:schemeClr val="accent3">
-                    <a:lumMod val="75000"/>
-                  </a:schemeClr>
-                </a:solidFill>
-              </a:rPr>
-              <a:t> </a:t>
-            </a:r>
-            <a:r>
-              <a:rPr lang="fr-FR" sz="1200" dirty="0" err="1">
-                <a:solidFill>
-                  <a:schemeClr val="accent3">
-                    <a:lumMod val="75000"/>
-                  </a:schemeClr>
-                </a:solidFill>
-              </a:rPr>
-              <a:t>yet</a:t>
-            </a:r>
-            <a:r>
-              <a:rPr lang="fr-FR" sz="1200" dirty="0">
-                <a:solidFill>
-                  <a:schemeClr val="accent3">
-                    <a:lumMod val="75000"/>
-                  </a:schemeClr>
-                </a:solidFill>
-              </a:rPr>
-              <a:t>’</a:t>
+                  <a:srgbClr val="7030A0"/>
+                </a:solidFill>
+              </a:rPr>
+              <a:t>-&gt; consolidation corresponds to TASS?</a:t>
             </a:r>
             <a:endParaRPr lang="fr-FR" sz="1200" dirty="0" smtClean="0">
               <a:solidFill>
@@ -5262,24 +5208,74 @@
           </a:p>
           <a:p>
             <a:r>
-              <a:rPr lang="fr-FR" sz="1200" dirty="0" smtClean="0">
+              <a:rPr lang="fr-FR" sz="1200" dirty="0">
                 <a:solidFill>
                   <a:schemeClr val="accent3">
                     <a:lumMod val="75000"/>
                   </a:schemeClr>
                 </a:solidFill>
               </a:rPr>
-              <a:t>  </a:t>
-            </a:r>
-            <a:r>
-              <a:rPr lang="fr-FR" sz="1200" dirty="0" err="1" smtClean="0">
+              <a:t> </a:t>
+            </a:r>
+            <a:r>
+              <a:rPr lang="fr-FR" sz="1200" dirty="0" smtClean="0">
                 <a:solidFill>
                   <a:schemeClr val="accent3">
                     <a:lumMod val="75000"/>
                   </a:schemeClr>
                 </a:solidFill>
               </a:rPr>
-              <a:t>Endif</a:t>
+              <a:t>   </a:t>
+            </a:r>
+            <a:r>
+              <a:rPr lang="fr-FR" sz="1200" dirty="0">
+                <a:solidFill>
+                  <a:schemeClr val="accent3">
+                    <a:lumMod val="75000"/>
+                  </a:schemeClr>
+                </a:solidFill>
+              </a:rPr>
+              <a:t>STOP ‘Not </a:t>
+            </a:r>
+            <a:r>
+              <a:rPr lang="fr-FR" sz="1200" dirty="0" err="1">
+                <a:solidFill>
+                  <a:schemeClr val="accent3">
+                    <a:lumMod val="75000"/>
+                  </a:schemeClr>
+                </a:solidFill>
+              </a:rPr>
+              <a:t>programmed</a:t>
+            </a:r>
+            <a:r>
+              <a:rPr lang="fr-FR" sz="1200" dirty="0">
+                <a:solidFill>
+                  <a:schemeClr val="accent3">
+                    <a:lumMod val="75000"/>
+                  </a:schemeClr>
+                </a:solidFill>
+              </a:rPr>
+              <a:t> </a:t>
+            </a:r>
+            <a:r>
+              <a:rPr lang="fr-FR" sz="1200" dirty="0" err="1">
+                <a:solidFill>
+                  <a:schemeClr val="accent3">
+                    <a:lumMod val="75000"/>
+                  </a:schemeClr>
+                </a:solidFill>
+              </a:rPr>
+              <a:t>yet</a:t>
+            </a:r>
+            <a:r>
+              <a:rPr lang="fr-FR" sz="1200" dirty="0">
+                <a:solidFill>
+                  <a:schemeClr val="accent3">
+                    <a:lumMod val="75000"/>
+                  </a:schemeClr>
+                </a:solidFill>
+              </a:rPr>
+              <a:t>’</a:t>
             </a:r>
             <a:endParaRPr lang="fr-FR" sz="1200" dirty="0" smtClean="0">
               <a:solidFill>
@@ -5290,6 +5286,26 @@
             </a:endParaRPr>
           </a:p>
           <a:p>
+            <a:r>
+              <a:rPr lang="fr-FR" sz="1200" dirty="0" smtClean="0">
+                <a:solidFill>
+                  <a:schemeClr val="accent3">
+                    <a:lumMod val="75000"/>
+                  </a:schemeClr>
+                </a:solidFill>
+              </a:rPr>
+              <a:t>  </a:t>
+            </a:r>
+            <a:r>
+              <a:rPr lang="fr-FR" sz="1200" dirty="0" err="1" smtClean="0">
+                <a:solidFill>
+                  <a:schemeClr val="accent3">
+                    <a:lumMod val="75000"/>
+                  </a:schemeClr>
+                </a:solidFill>
+              </a:rPr>
+              <a:t>Endif</a:t>
+            </a:r>
             <a:endParaRPr lang="fr-FR" sz="1200" dirty="0" smtClean="0">
               <a:solidFill>
                 <a:schemeClr val="accent3">
@@ -5299,6 +5315,15 @@
             </a:endParaRPr>
           </a:p>
           <a:p>
+            <a:endParaRPr lang="fr-FR" sz="1200" dirty="0" smtClean="0">
+              <a:solidFill>
+                <a:schemeClr val="accent3">
+                  <a:lumMod val="75000"/>
+                </a:schemeClr>
+              </a:solidFill>
+            </a:endParaRPr>
+          </a:p>
+          <a:p>
             <a:r>
               <a:rPr lang="fr-FR" sz="1200" dirty="0" smtClean="0">
                 <a:solidFill>
@@ -5310,7 +5335,7 @@
               <a:t>  if (</a:t>
             </a:r>
             <a:r>
-              <a:rPr lang="fr-FR" sz="1200" dirty="0">
+              <a:rPr lang="fr-FR" sz="1200" dirty="0" smtClean="0">
                 <a:solidFill>
                   <a:schemeClr val="accent3">
                     <a:lumMod val="75000"/>
@@ -5337,7 +5362,35 @@
                   </a:schemeClr>
                 </a:solidFill>
               </a:rPr>
-              <a:t>.GT.1) </a:t>
+              <a:t>.</a:t>
+            </a:r>
+            <a:r>
+              <a:rPr lang="fr-FR" sz="1200" dirty="0" smtClean="0">
+                <a:solidFill>
+                  <a:schemeClr val="accent3">
+                    <a:lumMod val="75000"/>
+                  </a:schemeClr>
+                </a:solidFill>
+              </a:rPr>
+              <a:t>GT.1</a:t>
+            </a:r>
+            <a:r>
+              <a:rPr lang="fr-FR" sz="1200" dirty="0" smtClean="0">
+                <a:solidFill>
+                  <a:srgbClr val="7030A0"/>
+                </a:solidFill>
+              </a:rPr>
+              <a:t>.AND.(.NOT. TASS</a:t>
+            </a:r>
+            <a:r>
+              <a:rPr lang="fr-FR" sz="1200" dirty="0" smtClean="0">
+                <a:solidFill>
+                  <a:schemeClr val="accent3">
+                    <a:lumMod val="75000"/>
+                  </a:schemeClr>
+                </a:solidFill>
+              </a:rPr>
+              <a:t>) </a:t>
             </a:r>
             <a:r>
               <a:rPr lang="fr-FR" sz="1200" dirty="0" err="1" smtClean="0">

</xml_diff>

<commit_message>
[src] fix inlet/outlet for bedload
 - modified mass balance
 - bug in FV for prescribed solid discharge
 - cleaning of useless variables in some subroutines for bedlaod
 - update and check on test case canal_solid_discharge_inflow
</commit_message>
<xml_diff>
--- a/documentation/sisyphe/convergence_sed.pptx
+++ b/documentation/sisyphe/convergence_sed.pptx
@@ -319,7 +319,7 @@
           <a:p>
             <a:fld id="{AA309A6D-C09C-4548-B29A-6CF363A7E532}" type="datetimeFigureOut">
               <a:rPr lang="fr-FR" smtClean="0"/>
-              <a:t>09/01/2018</a:t>
+              <a:t>15/02/2018</a:t>
             </a:fld>
             <a:endParaRPr lang="fr-BE"/>
           </a:p>
@@ -484,7 +484,7 @@
           <a:p>
             <a:fld id="{AA309A6D-C09C-4548-B29A-6CF363A7E532}" type="datetimeFigureOut">
               <a:rPr lang="fr-FR" smtClean="0"/>
-              <a:t>09/01/2018</a:t>
+              <a:t>15/02/2018</a:t>
             </a:fld>
             <a:endParaRPr lang="fr-BE"/>
           </a:p>
@@ -659,7 +659,7 @@
           <a:p>
             <a:fld id="{AA309A6D-C09C-4548-B29A-6CF363A7E532}" type="datetimeFigureOut">
               <a:rPr lang="fr-FR" smtClean="0"/>
-              <a:t>09/01/2018</a:t>
+              <a:t>15/02/2018</a:t>
             </a:fld>
             <a:endParaRPr lang="fr-BE"/>
           </a:p>
@@ -824,7 +824,7 @@
           <a:p>
             <a:fld id="{AA309A6D-C09C-4548-B29A-6CF363A7E532}" type="datetimeFigureOut">
               <a:rPr lang="fr-FR" smtClean="0"/>
-              <a:t>09/01/2018</a:t>
+              <a:t>15/02/2018</a:t>
             </a:fld>
             <a:endParaRPr lang="fr-BE"/>
           </a:p>
@@ -1065,7 +1065,7 @@
           <a:p>
             <a:fld id="{AA309A6D-C09C-4548-B29A-6CF363A7E532}" type="datetimeFigureOut">
               <a:rPr lang="fr-FR" smtClean="0"/>
-              <a:t>09/01/2018</a:t>
+              <a:t>15/02/2018</a:t>
             </a:fld>
             <a:endParaRPr lang="fr-BE"/>
           </a:p>
@@ -1348,7 +1348,7 @@
           <a:p>
             <a:fld id="{AA309A6D-C09C-4548-B29A-6CF363A7E532}" type="datetimeFigureOut">
               <a:rPr lang="fr-FR" smtClean="0"/>
-              <a:t>09/01/2018</a:t>
+              <a:t>15/02/2018</a:t>
             </a:fld>
             <a:endParaRPr lang="fr-BE"/>
           </a:p>
@@ -1765,7 +1765,7 @@
           <a:p>
             <a:fld id="{AA309A6D-C09C-4548-B29A-6CF363A7E532}" type="datetimeFigureOut">
               <a:rPr lang="fr-FR" smtClean="0"/>
-              <a:t>09/01/2018</a:t>
+              <a:t>15/02/2018</a:t>
             </a:fld>
             <a:endParaRPr lang="fr-BE"/>
           </a:p>
@@ -1878,7 +1878,7 @@
           <a:p>
             <a:fld id="{AA309A6D-C09C-4548-B29A-6CF363A7E532}" type="datetimeFigureOut">
               <a:rPr lang="fr-FR" smtClean="0"/>
-              <a:t>09/01/2018</a:t>
+              <a:t>15/02/2018</a:t>
             </a:fld>
             <a:endParaRPr lang="fr-BE"/>
           </a:p>
@@ -1968,7 +1968,7 @@
           <a:p>
             <a:fld id="{AA309A6D-C09C-4548-B29A-6CF363A7E532}" type="datetimeFigureOut">
               <a:rPr lang="fr-FR" smtClean="0"/>
-              <a:t>09/01/2018</a:t>
+              <a:t>15/02/2018</a:t>
             </a:fld>
             <a:endParaRPr lang="fr-BE"/>
           </a:p>
@@ -2240,7 +2240,7 @@
           <a:p>
             <a:fld id="{AA309A6D-C09C-4548-B29A-6CF363A7E532}" type="datetimeFigureOut">
               <a:rPr lang="fr-FR" smtClean="0"/>
-              <a:t>09/01/2018</a:t>
+              <a:t>15/02/2018</a:t>
             </a:fld>
             <a:endParaRPr lang="fr-BE"/>
           </a:p>
@@ -2488,7 +2488,7 @@
           <a:p>
             <a:fld id="{AA309A6D-C09C-4548-B29A-6CF363A7E532}" type="datetimeFigureOut">
               <a:rPr lang="fr-FR" smtClean="0"/>
-              <a:t>09/01/2018</a:t>
+              <a:t>15/02/2018</a:t>
             </a:fld>
             <a:endParaRPr lang="fr-BE"/>
           </a:p>
@@ -2696,7 +2696,7 @@
           <a:p>
             <a:fld id="{AA309A6D-C09C-4548-B29A-6CF363A7E532}" type="datetimeFigureOut">
               <a:rPr lang="fr-FR" smtClean="0"/>
-              <a:t>09/01/2018</a:t>
+              <a:t>15/02/2018</a:t>
             </a:fld>
             <a:endParaRPr lang="fr-BE"/>
           </a:p>
@@ -3347,12 +3347,20 @@
               <a:t>BED LOAD FOR </a:t>
             </a:r>
             <a:r>
-              <a:rPr lang="fr-FR" sz="1300" dirty="0">
+              <a:rPr lang="fr-FR" sz="1300">
                 <a:solidFill>
                   <a:schemeClr val="accent3"/>
                 </a:solidFill>
               </a:rPr>
-              <a:t>ALL SAND </a:t>
+              <a:t>ALL </a:t>
+            </a:r>
+            <a:r>
+              <a:rPr lang="fr-FR" sz="1300" smtClean="0">
+                <a:solidFill>
+                  <a:schemeClr val="accent3"/>
+                </a:solidFill>
+              </a:rPr>
+              <a:t>SANDS </a:t>
             </a:r>
             <a:r>
               <a:rPr lang="fr-FR" sz="1300" dirty="0">

</xml_diff>